<commit_message>
PCB design has been added to the presentation.
</commit_message>
<xml_diff>
--- a/Presentation/Final_presentation/Component_and_simulation_graphs.pptx
+++ b/Presentation/Final_presentation/Component_and_simulation_graphs.pptx
@@ -5,10 +5,10 @@
     <p:sldMasterId id="2147483886" r:id="rId1"/>
   </p:sldMasterIdLst>
   <p:notesMasterIdLst>
-    <p:notesMasterId r:id="rId27"/>
+    <p:notesMasterId r:id="rId29"/>
   </p:notesMasterIdLst>
   <p:handoutMasterIdLst>
-    <p:handoutMasterId r:id="rId28"/>
+    <p:handoutMasterId r:id="rId30"/>
   </p:handoutMasterIdLst>
   <p:sldIdLst>
     <p:sldId id="299" r:id="rId2"/>
@@ -35,7 +35,9 @@
     <p:sldId id="325" r:id="rId23"/>
     <p:sldId id="326" r:id="rId24"/>
     <p:sldId id="337" r:id="rId25"/>
-    <p:sldId id="336" r:id="rId26"/>
+    <p:sldId id="340" r:id="rId26"/>
+    <p:sldId id="339" r:id="rId27"/>
+    <p:sldId id="336" r:id="rId28"/>
   </p:sldIdLst>
   <p:sldSz cx="9144000" cy="6858000" type="screen4x3"/>
   <p:notesSz cx="6858000" cy="9144000"/>
@@ -14691,32 +14693,11 @@
           <a:bodyPr/>
           <a:lstStyle/>
           <a:p>
-            <a:endParaRPr lang="en-US"/>
-          </a:p>
-        </p:txBody>
-      </p:sp>
-      <p:sp>
-        <p:nvSpPr>
-          <p:cNvPr id="3" name="İçerik Yer Tutucusu 2">
-            <a:extLst>
-              <a:ext uri="{FF2B5EF4-FFF2-40B4-BE49-F238E27FC236}">
-                <a16:creationId xmlns:a16="http://schemas.microsoft.com/office/drawing/2014/main" id="{C7E0B523-894C-4B9F-B1E8-8A79952549A7}"/>
-              </a:ext>
-            </a:extLst>
-          </p:cNvPr>
-          <p:cNvSpPr>
-            <a:spLocks noGrp="1"/>
-          </p:cNvSpPr>
-          <p:nvPr>
-            <p:ph idx="1"/>
-          </p:nvPr>
-        </p:nvSpPr>
-        <p:spPr/>
-        <p:txBody>
-          <a:bodyPr/>
-          <a:lstStyle/>
-          <a:p>
-            <a:endParaRPr lang="en-US"/>
+            <a:r>
+              <a:rPr lang="tr-TR" dirty="0"/>
+              <a:t>PCB Design</a:t>
+            </a:r>
+            <a:endParaRPr lang="en-US" dirty="0"/>
           </a:p>
         </p:txBody>
       </p:sp>
@@ -14787,6 +14768,86 @@
           </a:p>
         </p:txBody>
       </p:sp>
+      <p:pic>
+        <p:nvPicPr>
+          <p:cNvPr id="6" name="İçerik Yer Tutucusu 5">
+            <a:extLst>
+              <a:ext uri="{FF2B5EF4-FFF2-40B4-BE49-F238E27FC236}">
+                <a16:creationId xmlns:a16="http://schemas.microsoft.com/office/drawing/2014/main" id="{02532367-DD39-44B1-A0F1-47CC5C296402}"/>
+              </a:ext>
+            </a:extLst>
+          </p:cNvPr>
+          <p:cNvPicPr>
+            <a:picLocks noGrp="1"/>
+          </p:cNvPicPr>
+          <p:nvPr>
+            <p:ph idx="1"/>
+          </p:nvPr>
+        </p:nvPicPr>
+        <p:blipFill>
+          <a:blip r:embed="rId2"/>
+          <a:stretch>
+            <a:fillRect/>
+          </a:stretch>
+        </p:blipFill>
+        <p:spPr>
+          <a:xfrm>
+            <a:off x="1033462" y="1643063"/>
+            <a:ext cx="6591300" cy="4133850"/>
+          </a:xfrm>
+          <a:prstGeom prst="rect">
+            <a:avLst/>
+          </a:prstGeom>
+        </p:spPr>
+      </p:pic>
+      <p:sp>
+        <p:nvSpPr>
+          <p:cNvPr id="8" name="Metin kutusu 7">
+            <a:extLst>
+              <a:ext uri="{FF2B5EF4-FFF2-40B4-BE49-F238E27FC236}">
+                <a16:creationId xmlns:a16="http://schemas.microsoft.com/office/drawing/2014/main" id="{60EF26C9-DC25-4ED2-BD00-66048DE12CE7}"/>
+              </a:ext>
+            </a:extLst>
+          </p:cNvPr>
+          <p:cNvSpPr txBox="1"/>
+          <p:nvPr/>
+        </p:nvSpPr>
+        <p:spPr>
+          <a:xfrm>
+            <a:off x="2014537" y="5871935"/>
+            <a:ext cx="4629150" cy="368755"/>
+          </a:xfrm>
+          <a:prstGeom prst="rect">
+            <a:avLst/>
+          </a:prstGeom>
+          <a:noFill/>
+        </p:spPr>
+        <p:txBody>
+          <a:bodyPr wrap="square">
+            <a:spAutoFit/>
+          </a:bodyPr>
+          <a:lstStyle/>
+          <a:p>
+            <a:pPr algn="ctr">
+              <a:lnSpc>
+                <a:spcPct val="107000"/>
+              </a:lnSpc>
+              <a:spcAft>
+                <a:spcPts val="800"/>
+              </a:spcAft>
+            </a:pPr>
+            <a:r>
+              <a:rPr lang="en-US" sz="1800" dirty="0">
+                <a:effectLst/>
+                <a:latin typeface="Times New Roman" panose="02020603050405020304" pitchFamily="18" charset="0"/>
+                <a:ea typeface="Calibri" panose="020F0502020204030204" pitchFamily="34" charset="0"/>
+                <a:cs typeface="Times New Roman" panose="02020603050405020304" pitchFamily="18" charset="0"/>
+              </a:rPr>
+              <a:t>Overall PCB Design</a:t>
+            </a:r>
+          </a:p>
+        </p:txBody>
+      </p:sp>
     </p:spTree>
     <p:extLst>
       <p:ext uri="{BB962C8B-B14F-4D97-AF65-F5344CB8AC3E}">
@@ -14801,6 +14862,487 @@
 </file>
 
 <file path=ppt/slides/slide25.xml><?xml version="1.0" encoding="utf-8"?>
+<p:sld xmlns:a="http://schemas.openxmlformats.org/drawingml/2006/main" xmlns:r="http://schemas.openxmlformats.org/officeDocument/2006/relationships" xmlns:p="http://schemas.openxmlformats.org/presentationml/2006/main">
+  <p:cSld>
+    <p:spTree>
+      <p:nvGrpSpPr>
+        <p:cNvPr id="1" name=""/>
+        <p:cNvGrpSpPr/>
+        <p:nvPr/>
+      </p:nvGrpSpPr>
+      <p:grpSpPr>
+        <a:xfrm>
+          <a:off x="0" y="0"/>
+          <a:ext cx="0" cy="0"/>
+          <a:chOff x="0" y="0"/>
+          <a:chExt cx="0" cy="0"/>
+        </a:xfrm>
+      </p:grpSpPr>
+      <p:sp>
+        <p:nvSpPr>
+          <p:cNvPr id="4" name="Slayt Numarası Yer Tutucusu 3">
+            <a:extLst>
+              <a:ext uri="{FF2B5EF4-FFF2-40B4-BE49-F238E27FC236}">
+                <a16:creationId xmlns:a16="http://schemas.microsoft.com/office/drawing/2014/main" id="{69A6355F-BA7D-4FD3-ACC8-D384AA9144C3}"/>
+              </a:ext>
+            </a:extLst>
+          </p:cNvPr>
+          <p:cNvSpPr>
+            <a:spLocks noGrp="1"/>
+          </p:cNvSpPr>
+          <p:nvPr>
+            <p:ph type="sldNum" sz="quarter" idx="12"/>
+          </p:nvPr>
+        </p:nvSpPr>
+        <p:spPr/>
+        <p:txBody>
+          <a:bodyPr/>
+          <a:lstStyle/>
+          <a:p>
+            <a:pPr>
+              <a:defRPr/>
+            </a:pPr>
+            <a:fld id="{C878F797-6006-4DDA-AFE9-456F280FE6C5}" type="slidenum">
+              <a:rPr lang="en-US" smtClean="0"/>
+              <a:pPr>
+                <a:defRPr/>
+              </a:pPr>
+              <a:t>25</a:t>
+            </a:fld>
+            <a:endParaRPr lang="en-US" dirty="0"/>
+          </a:p>
+        </p:txBody>
+      </p:sp>
+      <p:sp>
+        <p:nvSpPr>
+          <p:cNvPr id="5" name="Veri Yer Tutucusu 4">
+            <a:extLst>
+              <a:ext uri="{FF2B5EF4-FFF2-40B4-BE49-F238E27FC236}">
+                <a16:creationId xmlns:a16="http://schemas.microsoft.com/office/drawing/2014/main" id="{84C6B728-7D0E-41DC-AC9A-34859B577560}"/>
+              </a:ext>
+            </a:extLst>
+          </p:cNvPr>
+          <p:cNvSpPr>
+            <a:spLocks noGrp="1"/>
+          </p:cNvSpPr>
+          <p:nvPr>
+            <p:ph type="dt" sz="half" idx="2"/>
+          </p:nvPr>
+        </p:nvSpPr>
+        <p:spPr/>
+        <p:txBody>
+          <a:bodyPr/>
+          <a:lstStyle/>
+          <a:p>
+            <a:pPr>
+              <a:defRPr/>
+            </a:pPr>
+            <a:r>
+              <a:rPr lang="tr-TR"/>
+              <a:t>METU Electrical &amp; Electronics Engineering Department</a:t>
+            </a:r>
+            <a:endParaRPr lang="en-US" dirty="0"/>
+          </a:p>
+        </p:txBody>
+      </p:sp>
+      <p:pic>
+        <p:nvPicPr>
+          <p:cNvPr id="6" name="Resim 5">
+            <a:extLst>
+              <a:ext uri="{FF2B5EF4-FFF2-40B4-BE49-F238E27FC236}">
+                <a16:creationId xmlns:a16="http://schemas.microsoft.com/office/drawing/2014/main" id="{8E80EC86-16D6-4E40-AB61-C9CED21356F5}"/>
+              </a:ext>
+            </a:extLst>
+          </p:cNvPr>
+          <p:cNvPicPr/>
+          <p:nvPr/>
+        </p:nvPicPr>
+        <p:blipFill>
+          <a:blip r:embed="rId2"/>
+          <a:stretch>
+            <a:fillRect/>
+          </a:stretch>
+        </p:blipFill>
+        <p:spPr>
+          <a:xfrm>
+            <a:off x="334961" y="935037"/>
+            <a:ext cx="8691735" cy="4987925"/>
+          </a:xfrm>
+          <a:prstGeom prst="rect">
+            <a:avLst/>
+          </a:prstGeom>
+        </p:spPr>
+      </p:pic>
+      <p:sp>
+        <p:nvSpPr>
+          <p:cNvPr id="8" name="Metin kutusu 7">
+            <a:extLst>
+              <a:ext uri="{FF2B5EF4-FFF2-40B4-BE49-F238E27FC236}">
+                <a16:creationId xmlns:a16="http://schemas.microsoft.com/office/drawing/2014/main" id="{B7C2359C-1E29-4C96-8B8B-F82785A9FA26}"/>
+              </a:ext>
+            </a:extLst>
+          </p:cNvPr>
+          <p:cNvSpPr txBox="1"/>
+          <p:nvPr/>
+        </p:nvSpPr>
+        <p:spPr>
+          <a:xfrm>
+            <a:off x="2143125" y="5738296"/>
+            <a:ext cx="4629150" cy="369332"/>
+          </a:xfrm>
+          <a:prstGeom prst="rect">
+            <a:avLst/>
+          </a:prstGeom>
+          <a:noFill/>
+        </p:spPr>
+        <p:txBody>
+          <a:bodyPr wrap="square">
+            <a:spAutoFit/>
+          </a:bodyPr>
+          <a:lstStyle/>
+          <a:p>
+            <a:pPr algn="ctr">
+              <a:spcAft>
+                <a:spcPts val="1000"/>
+              </a:spcAft>
+            </a:pPr>
+            <a:r>
+              <a:rPr lang="en-US" sz="1800" i="0" dirty="0">
+                <a:solidFill>
+                  <a:srgbClr val="44546A"/>
+                </a:solidFill>
+                <a:effectLst/>
+                <a:latin typeface="Times New Roman" panose="02020603050405020304" pitchFamily="18" charset="0"/>
+                <a:ea typeface="Calibri" panose="020F0502020204030204" pitchFamily="34" charset="0"/>
+                <a:cs typeface="Times New Roman" panose="02020603050405020304" pitchFamily="18" charset="0"/>
+              </a:rPr>
+              <a:t>Top view of the PCB</a:t>
+            </a:r>
+            <a:endParaRPr lang="en-US" sz="1100" i="1" dirty="0">
+              <a:solidFill>
+                <a:srgbClr val="44546A"/>
+              </a:solidFill>
+              <a:effectLst/>
+              <a:latin typeface="Times New Roman" panose="02020603050405020304" pitchFamily="18" charset="0"/>
+              <a:ea typeface="Calibri" panose="020F0502020204030204" pitchFamily="34" charset="0"/>
+              <a:cs typeface="Times New Roman" panose="02020603050405020304" pitchFamily="18" charset="0"/>
+            </a:endParaRPr>
+          </a:p>
+        </p:txBody>
+      </p:sp>
+    </p:spTree>
+    <p:extLst>
+      <p:ext uri="{BB962C8B-B14F-4D97-AF65-F5344CB8AC3E}">
+        <p14:creationId xmlns:p14="http://schemas.microsoft.com/office/powerpoint/2010/main" val="3493207559"/>
+      </p:ext>
+    </p:extLst>
+  </p:cSld>
+  <p:clrMapOvr>
+    <a:masterClrMapping/>
+  </p:clrMapOvr>
+</p:sld>
+</file>
+
+<file path=ppt/slides/slide26.xml><?xml version="1.0" encoding="utf-8"?>
+<p:sld xmlns:a="http://schemas.openxmlformats.org/drawingml/2006/main" xmlns:r="http://schemas.openxmlformats.org/officeDocument/2006/relationships" xmlns:p="http://schemas.openxmlformats.org/presentationml/2006/main">
+  <p:cSld>
+    <p:spTree>
+      <p:nvGrpSpPr>
+        <p:cNvPr id="1" name=""/>
+        <p:cNvGrpSpPr/>
+        <p:nvPr/>
+      </p:nvGrpSpPr>
+      <p:grpSpPr>
+        <a:xfrm>
+          <a:off x="0" y="0"/>
+          <a:ext cx="0" cy="0"/>
+          <a:chOff x="0" y="0"/>
+          <a:chExt cx="0" cy="0"/>
+        </a:xfrm>
+      </p:grpSpPr>
+      <p:sp>
+        <p:nvSpPr>
+          <p:cNvPr id="2" name="Başlık 1">
+            <a:extLst>
+              <a:ext uri="{FF2B5EF4-FFF2-40B4-BE49-F238E27FC236}">
+                <a16:creationId xmlns:a16="http://schemas.microsoft.com/office/drawing/2014/main" id="{759DD6AD-628E-48D5-98E7-747C7E548331}"/>
+              </a:ext>
+            </a:extLst>
+          </p:cNvPr>
+          <p:cNvSpPr>
+            <a:spLocks noGrp="1"/>
+          </p:cNvSpPr>
+          <p:nvPr>
+            <p:ph type="title"/>
+          </p:nvPr>
+        </p:nvSpPr>
+        <p:spPr/>
+        <p:txBody>
+          <a:bodyPr/>
+          <a:lstStyle/>
+          <a:p>
+            <a:endParaRPr lang="en-US"/>
+          </a:p>
+        </p:txBody>
+      </p:sp>
+      <p:sp>
+        <p:nvSpPr>
+          <p:cNvPr id="4" name="Slayt Numarası Yer Tutucusu 3">
+            <a:extLst>
+              <a:ext uri="{FF2B5EF4-FFF2-40B4-BE49-F238E27FC236}">
+                <a16:creationId xmlns:a16="http://schemas.microsoft.com/office/drawing/2014/main" id="{CEB9CF59-B214-4928-AA4A-0870B2D99B6F}"/>
+              </a:ext>
+            </a:extLst>
+          </p:cNvPr>
+          <p:cNvSpPr>
+            <a:spLocks noGrp="1"/>
+          </p:cNvSpPr>
+          <p:nvPr>
+            <p:ph type="sldNum" sz="quarter" idx="12"/>
+          </p:nvPr>
+        </p:nvSpPr>
+        <p:spPr/>
+        <p:txBody>
+          <a:bodyPr/>
+          <a:lstStyle/>
+          <a:p>
+            <a:pPr>
+              <a:defRPr/>
+            </a:pPr>
+            <a:fld id="{C878F797-6006-4DDA-AFE9-456F280FE6C5}" type="slidenum">
+              <a:rPr lang="en-US" smtClean="0"/>
+              <a:pPr>
+                <a:defRPr/>
+              </a:pPr>
+              <a:t>26</a:t>
+            </a:fld>
+            <a:endParaRPr lang="en-US" dirty="0"/>
+          </a:p>
+        </p:txBody>
+      </p:sp>
+      <p:sp>
+        <p:nvSpPr>
+          <p:cNvPr id="5" name="Veri Yer Tutucusu 4">
+            <a:extLst>
+              <a:ext uri="{FF2B5EF4-FFF2-40B4-BE49-F238E27FC236}">
+                <a16:creationId xmlns:a16="http://schemas.microsoft.com/office/drawing/2014/main" id="{C5202674-01A5-429F-A27B-52F5FE7E8456}"/>
+              </a:ext>
+            </a:extLst>
+          </p:cNvPr>
+          <p:cNvSpPr>
+            <a:spLocks noGrp="1"/>
+          </p:cNvSpPr>
+          <p:nvPr>
+            <p:ph type="dt" sz="half" idx="2"/>
+          </p:nvPr>
+        </p:nvSpPr>
+        <p:spPr/>
+        <p:txBody>
+          <a:bodyPr/>
+          <a:lstStyle/>
+          <a:p>
+            <a:pPr>
+              <a:defRPr/>
+            </a:pPr>
+            <a:r>
+              <a:rPr lang="tr-TR"/>
+              <a:t>METU Electrical &amp; Electronics Engineering Department</a:t>
+            </a:r>
+            <a:endParaRPr lang="en-US" dirty="0"/>
+          </a:p>
+        </p:txBody>
+      </p:sp>
+      <p:pic>
+        <p:nvPicPr>
+          <p:cNvPr id="6" name="İçerik Yer Tutucusu 5">
+            <a:extLst>
+              <a:ext uri="{FF2B5EF4-FFF2-40B4-BE49-F238E27FC236}">
+                <a16:creationId xmlns:a16="http://schemas.microsoft.com/office/drawing/2014/main" id="{2528AB53-E5B4-4F04-8B47-93BC68A37AD1}"/>
+              </a:ext>
+            </a:extLst>
+          </p:cNvPr>
+          <p:cNvPicPr>
+            <a:picLocks noGrp="1"/>
+          </p:cNvPicPr>
+          <p:nvPr>
+            <p:ph idx="1"/>
+          </p:nvPr>
+        </p:nvPicPr>
+        <p:blipFill>
+          <a:blip r:embed="rId2"/>
+          <a:stretch>
+            <a:fillRect/>
+          </a:stretch>
+        </p:blipFill>
+        <p:spPr>
+          <a:xfrm>
+            <a:off x="4400550" y="300048"/>
+            <a:ext cx="4743450" cy="2990850"/>
+          </a:xfrm>
+          <a:prstGeom prst="rect">
+            <a:avLst/>
+          </a:prstGeom>
+        </p:spPr>
+      </p:pic>
+      <p:pic>
+        <p:nvPicPr>
+          <p:cNvPr id="7" name="Resim 6">
+            <a:extLst>
+              <a:ext uri="{FF2B5EF4-FFF2-40B4-BE49-F238E27FC236}">
+                <a16:creationId xmlns:a16="http://schemas.microsoft.com/office/drawing/2014/main" id="{9162C7EA-19E9-4491-B7E7-24E258130823}"/>
+              </a:ext>
+            </a:extLst>
+          </p:cNvPr>
+          <p:cNvPicPr/>
+          <p:nvPr/>
+        </p:nvPicPr>
+        <p:blipFill>
+          <a:blip r:embed="rId3"/>
+          <a:stretch>
+            <a:fillRect/>
+          </a:stretch>
+        </p:blipFill>
+        <p:spPr>
+          <a:xfrm>
+            <a:off x="-9525" y="300048"/>
+            <a:ext cx="4410075" cy="2990850"/>
+          </a:xfrm>
+          <a:prstGeom prst="rect">
+            <a:avLst/>
+          </a:prstGeom>
+        </p:spPr>
+      </p:pic>
+      <p:pic>
+        <p:nvPicPr>
+          <p:cNvPr id="8" name="Resim 7">
+            <a:extLst>
+              <a:ext uri="{FF2B5EF4-FFF2-40B4-BE49-F238E27FC236}">
+                <a16:creationId xmlns:a16="http://schemas.microsoft.com/office/drawing/2014/main" id="{5722D840-7376-4256-A2DC-EA82A1F29A38}"/>
+              </a:ext>
+            </a:extLst>
+          </p:cNvPr>
+          <p:cNvPicPr/>
+          <p:nvPr/>
+        </p:nvPicPr>
+        <p:blipFill>
+          <a:blip r:embed="rId4"/>
+          <a:stretch>
+            <a:fillRect/>
+          </a:stretch>
+        </p:blipFill>
+        <p:spPr>
+          <a:xfrm>
+            <a:off x="185738" y="3376626"/>
+            <a:ext cx="4486275" cy="3162300"/>
+          </a:xfrm>
+          <a:prstGeom prst="rect">
+            <a:avLst/>
+          </a:prstGeom>
+        </p:spPr>
+      </p:pic>
+      <p:sp>
+        <p:nvSpPr>
+          <p:cNvPr id="9" name="Metin kutusu 8">
+            <a:extLst>
+              <a:ext uri="{FF2B5EF4-FFF2-40B4-BE49-F238E27FC236}">
+                <a16:creationId xmlns:a16="http://schemas.microsoft.com/office/drawing/2014/main" id="{ED23552E-67CE-4004-8648-F0D69E071C15}"/>
+              </a:ext>
+            </a:extLst>
+          </p:cNvPr>
+          <p:cNvSpPr txBox="1"/>
+          <p:nvPr/>
+        </p:nvSpPr>
+        <p:spPr>
+          <a:xfrm>
+            <a:off x="5372100" y="4100513"/>
+            <a:ext cx="3043238" cy="1477328"/>
+          </a:xfrm>
+          <a:prstGeom prst="rect">
+            <a:avLst/>
+          </a:prstGeom>
+          <a:noFill/>
+        </p:spPr>
+        <p:txBody>
+          <a:bodyPr wrap="square" rtlCol="0">
+            <a:spAutoFit/>
+          </a:bodyPr>
+          <a:lstStyle/>
+          <a:p>
+            <a:r>
+              <a:rPr lang="tr-TR" dirty="0" err="1"/>
+              <a:t>Dimensions</a:t>
+            </a:r>
+            <a:r>
+              <a:rPr lang="tr-TR" dirty="0"/>
+              <a:t>:</a:t>
+            </a:r>
+          </a:p>
+          <a:p>
+            <a:r>
+              <a:rPr lang="tr-TR" dirty="0"/>
+              <a:t>3.7 x 6.2 x 4 = 91.76 cm^3</a:t>
+            </a:r>
+          </a:p>
+          <a:p>
+            <a:endParaRPr lang="tr-TR" dirty="0"/>
+          </a:p>
+          <a:p>
+            <a:r>
+              <a:rPr lang="tr-TR" dirty="0" err="1"/>
+              <a:t>With</a:t>
+            </a:r>
+            <a:r>
+              <a:rPr lang="tr-TR" dirty="0"/>
+              <a:t> </a:t>
+            </a:r>
+            <a:r>
+              <a:rPr lang="tr-TR" dirty="0" err="1"/>
+              <a:t>the</a:t>
+            </a:r>
+            <a:r>
+              <a:rPr lang="tr-TR" dirty="0"/>
+              <a:t> </a:t>
+            </a:r>
+            <a:r>
+              <a:rPr lang="tr-TR" dirty="0" err="1"/>
+              <a:t>heat</a:t>
+            </a:r>
+            <a:r>
+              <a:rPr lang="tr-TR" dirty="0"/>
+              <a:t> </a:t>
+            </a:r>
+            <a:r>
+              <a:rPr lang="tr-TR" dirty="0" err="1"/>
+              <a:t>sink</a:t>
+            </a:r>
+            <a:r>
+              <a:rPr lang="tr-TR" dirty="0"/>
+              <a:t>:</a:t>
+            </a:r>
+          </a:p>
+          <a:p>
+            <a:r>
+              <a:rPr lang="tr-TR" dirty="0"/>
+              <a:t>4.5 x 6.2 x 4 = 111.6 cm^3</a:t>
+            </a:r>
+            <a:endParaRPr lang="en-US" dirty="0"/>
+          </a:p>
+        </p:txBody>
+      </p:sp>
+    </p:spTree>
+    <p:extLst>
+      <p:ext uri="{BB962C8B-B14F-4D97-AF65-F5344CB8AC3E}">
+        <p14:creationId xmlns:p14="http://schemas.microsoft.com/office/powerpoint/2010/main" val="4279752400"/>
+      </p:ext>
+    </p:extLst>
+  </p:cSld>
+  <p:clrMapOvr>
+    <a:masterClrMapping/>
+  </p:clrMapOvr>
+</p:sld>
+</file>
+
+<file path=ppt/slides/slide27.xml><?xml version="1.0" encoding="utf-8"?>
 <p:sld xmlns:a="http://schemas.openxmlformats.org/drawingml/2006/main" xmlns:r="http://schemas.openxmlformats.org/officeDocument/2006/relationships" xmlns:p="http://schemas.openxmlformats.org/presentationml/2006/main">
   <p:cSld>
     <p:spTree>
@@ -14866,7 +15408,7 @@
             <p:ph idx="1"/>
             <p:extLst>
               <p:ext uri="{D42A27DB-BD31-4B8C-83A1-F6EECF244321}">
-                <p14:modId xmlns:p14="http://schemas.microsoft.com/office/powerpoint/2010/main" val="1817257147"/>
+                <p14:modId xmlns:p14="http://schemas.microsoft.com/office/powerpoint/2010/main" val="3162033003"/>
               </p:ext>
             </p:extLst>
           </p:nvPr>
@@ -16116,6 +16658,12 @@
                         </a:rPr>
                         <a:t> </a:t>
                       </a:r>
+                      <a:r>
+                        <a:rPr lang="tr-TR" sz="1200" dirty="0">
+                          <a:effectLst/>
+                        </a:rPr>
+                        <a:t>0.679</a:t>
+                      </a:r>
                       <a:endParaRPr lang="en-US" sz="1200" dirty="0">
                         <a:effectLst/>
                         <a:latin typeface="Times New Roman" panose="02020603050405020304" pitchFamily="18" charset="0"/>
@@ -16176,10 +16724,13 @@
                         </a:spcAft>
                       </a:pPr>
                       <a:r>
-                        <a:rPr lang="en-US" sz="1200" dirty="0">
+                        <a:rPr lang="tr-TR" sz="1200" dirty="0">
                           <a:effectLst/>
+                          <a:latin typeface="Times New Roman" panose="02020603050405020304" pitchFamily="18" charset="0"/>
+                          <a:ea typeface="Calibri" panose="020F0502020204030204" pitchFamily="34" charset="0"/>
+                          <a:cs typeface="Times New Roman" panose="02020603050405020304" pitchFamily="18" charset="0"/>
                         </a:rPr>
-                        <a:t>7.619</a:t>
+                        <a:t>8.298</a:t>
                       </a:r>
                       <a:endParaRPr lang="en-US" sz="1200" dirty="0">
                         <a:effectLst/>
@@ -16230,7 +16781,7 @@
               <a:pPr>
                 <a:defRPr/>
               </a:pPr>
-              <a:t>25</a:t>
+              <a:t>27</a:t>
             </a:fld>
             <a:endParaRPr lang="en-US" dirty="0"/>
           </a:p>
@@ -16781,8 +17332,8 @@
           </a:p>
         </p:txBody>
       </p:sp>
-      <mc:AlternateContent xmlns:mc="http://schemas.openxmlformats.org/markup-compatibility/2006">
-        <mc:Choice xmlns:a14="http://schemas.microsoft.com/office/drawing/2010/main" Requires="a14">
+      <mc:AlternateContent xmlns:mc="http://schemas.openxmlformats.org/markup-compatibility/2006" xmlns:a14="http://schemas.microsoft.com/office/drawing/2010/main">
+        <mc:Choice Requires="a14">
           <p:sp>
             <p:nvSpPr>
               <p:cNvPr id="5" name="İçerik Yer Tutucusu 4">
@@ -16982,7 +17533,7 @@
             </p:txBody>
           </p:sp>
         </mc:Choice>
-        <mc:Fallback>
+        <mc:Fallback xmlns="">
           <p:sp>
             <p:nvSpPr>
               <p:cNvPr id="5" name="İçerik Yer Tutucusu 4">
@@ -17495,8 +18046,8 @@
           </a:prstGeom>
         </p:spPr>
       </p:pic>
-      <mc:AlternateContent xmlns:mc="http://schemas.openxmlformats.org/markup-compatibility/2006">
-        <mc:Choice xmlns:a14="http://schemas.microsoft.com/office/drawing/2010/main" Requires="a14">
+      <mc:AlternateContent xmlns:mc="http://schemas.openxmlformats.org/markup-compatibility/2006" xmlns:a14="http://schemas.microsoft.com/office/drawing/2010/main">
+        <mc:Choice Requires="a14">
           <p:sp>
             <p:nvSpPr>
               <p:cNvPr id="12" name="Metin kutusu 11">
@@ -17525,6 +18076,7 @@
               </a:bodyPr>
               <a:lstStyle/>
               <a:p>
+                <a:pPr/>
                 <a14:m>
                   <m:oMathPara xmlns:m="http://schemas.openxmlformats.org/officeDocument/2006/math">
                     <m:oMathParaPr>
@@ -17762,7 +18314,7 @@
             </p:txBody>
           </p:sp>
         </mc:Choice>
-        <mc:Fallback>
+        <mc:Fallback xmlns="">
           <p:sp>
             <p:nvSpPr>
               <p:cNvPr id="12" name="Metin kutusu 11">
@@ -17975,7 +18527,7 @@
                 <a:ea typeface="Calibri" panose="020F0502020204030204" pitchFamily="34" charset="0"/>
                 <a:cs typeface="Times New Roman" panose="02020603050405020304" pitchFamily="18" charset="0"/>
               </a:rPr>
-              <a:t>Figure 4: Kool Mµ E Core </a:t>
+              <a:t>Kool Mµ E Core </a:t>
             </a:r>
             <a:r>
               <a:rPr lang="en-US" sz="1800" dirty="0" err="1">

</xml_diff>

<commit_message>
Some adjustments have been done.
</commit_message>
<xml_diff>
--- a/Presentation/Final_presentation/Component_and_simulation_graphs.pptx
+++ b/Presentation/Final_presentation/Component_and_simulation_graphs.pptx
@@ -5,10 +5,10 @@
     <p:sldMasterId id="2147483886" r:id="rId1"/>
   </p:sldMasterIdLst>
   <p:notesMasterIdLst>
-    <p:notesMasterId r:id="rId29"/>
+    <p:notesMasterId r:id="rId30"/>
   </p:notesMasterIdLst>
   <p:handoutMasterIdLst>
-    <p:handoutMasterId r:id="rId30"/>
+    <p:handoutMasterId r:id="rId31"/>
   </p:handoutMasterIdLst>
   <p:sldIdLst>
     <p:sldId id="299" r:id="rId2"/>
@@ -21,23 +21,24 @@
     <p:sldId id="335" r:id="rId9"/>
     <p:sldId id="329" r:id="rId10"/>
     <p:sldId id="332" r:id="rId11"/>
-    <p:sldId id="331" r:id="rId12"/>
-    <p:sldId id="315" r:id="rId13"/>
-    <p:sldId id="316" r:id="rId14"/>
-    <p:sldId id="317" r:id="rId15"/>
-    <p:sldId id="318" r:id="rId16"/>
-    <p:sldId id="319" r:id="rId17"/>
-    <p:sldId id="320" r:id="rId18"/>
-    <p:sldId id="321" r:id="rId19"/>
-    <p:sldId id="322" r:id="rId20"/>
-    <p:sldId id="323" r:id="rId21"/>
-    <p:sldId id="324" r:id="rId22"/>
-    <p:sldId id="325" r:id="rId23"/>
-    <p:sldId id="326" r:id="rId24"/>
-    <p:sldId id="337" r:id="rId25"/>
-    <p:sldId id="340" r:id="rId26"/>
-    <p:sldId id="339" r:id="rId27"/>
-    <p:sldId id="336" r:id="rId28"/>
+    <p:sldId id="315" r:id="rId12"/>
+    <p:sldId id="316" r:id="rId13"/>
+    <p:sldId id="317" r:id="rId14"/>
+    <p:sldId id="318" r:id="rId15"/>
+    <p:sldId id="319" r:id="rId16"/>
+    <p:sldId id="320" r:id="rId17"/>
+    <p:sldId id="321" r:id="rId18"/>
+    <p:sldId id="322" r:id="rId19"/>
+    <p:sldId id="323" r:id="rId20"/>
+    <p:sldId id="324" r:id="rId21"/>
+    <p:sldId id="325" r:id="rId22"/>
+    <p:sldId id="326" r:id="rId23"/>
+    <p:sldId id="341" r:id="rId24"/>
+    <p:sldId id="338" r:id="rId25"/>
+    <p:sldId id="337" r:id="rId26"/>
+    <p:sldId id="340" r:id="rId27"/>
+    <p:sldId id="339" r:id="rId28"/>
+    <p:sldId id="336" r:id="rId29"/>
   </p:sldIdLst>
   <p:sldSz cx="9144000" cy="6858000" type="screen4x3"/>
   <p:notesSz cx="6858000" cy="9144000"/>
@@ -1056,7 +1057,7 @@
           </a:r>
           <a:r>
             <a:rPr lang="tr-TR" dirty="0" err="1"/>
-            <a:t>selection</a:t>
+            <a:t>Selection</a:t>
           </a:r>
           <a:endParaRPr lang="en-US" dirty="0"/>
         </a:p>
@@ -1163,7 +1164,31 @@
           </a:r>
           <a:r>
             <a:rPr lang="tr-TR" dirty="0" err="1"/>
-            <a:t>selection</a:t>
+            <a:t>Selection</a:t>
+          </a:r>
+          <a:r>
+            <a:rPr lang="tr-TR" dirty="0"/>
+            <a:t> </a:t>
+          </a:r>
+          <a:r>
+            <a:rPr lang="tr-TR" dirty="0" err="1"/>
+            <a:t>and</a:t>
+          </a:r>
+          <a:r>
+            <a:rPr lang="tr-TR" dirty="0"/>
+            <a:t> </a:t>
+          </a:r>
+          <a:r>
+            <a:rPr lang="tr-TR" dirty="0" err="1"/>
+            <a:t>Simulation</a:t>
+          </a:r>
+          <a:r>
+            <a:rPr lang="tr-TR" dirty="0"/>
+            <a:t> </a:t>
+          </a:r>
+          <a:r>
+            <a:rPr lang="tr-TR" dirty="0" err="1"/>
+            <a:t>Results</a:t>
           </a:r>
           <a:endParaRPr lang="en-US" dirty="0"/>
         </a:p>
@@ -1233,7 +1258,7 @@
         <a:p>
           <a:r>
             <a:rPr lang="tr-TR" dirty="0" err="1"/>
-            <a:t>Simulation</a:t>
+            <a:t>Losses</a:t>
           </a:r>
           <a:r>
             <a:rPr lang="tr-TR" dirty="0"/>
@@ -1241,7 +1266,23 @@
           </a:r>
           <a:r>
             <a:rPr lang="tr-TR" dirty="0" err="1"/>
-            <a:t>results</a:t>
+            <a:t>and</a:t>
+          </a:r>
+          <a:r>
+            <a:rPr lang="tr-TR" dirty="0"/>
+            <a:t> </a:t>
+          </a:r>
+          <a:r>
+            <a:rPr lang="tr-TR" dirty="0" err="1"/>
+            <a:t>Thermal</a:t>
+          </a:r>
+          <a:r>
+            <a:rPr lang="tr-TR" dirty="0"/>
+            <a:t> </a:t>
+          </a:r>
+          <a:r>
+            <a:rPr lang="tr-TR" dirty="0" err="1"/>
+            <a:t>Results</a:t>
           </a:r>
           <a:endParaRPr lang="en-US" dirty="0"/>
         </a:p>
@@ -1276,7 +1317,7 @@
         <a:bodyPr/>
         <a:lstStyle/>
         <a:p>
-          <a:endParaRPr lang="en-US"/>
+          <a:endParaRPr lang="en-US" dirty="0"/>
         </a:p>
       </dgm:t>
     </dgm:pt>
@@ -1311,11 +1352,7 @@
         <a:p>
           <a:r>
             <a:rPr lang="tr-TR" dirty="0"/>
-            <a:t>PCB </a:t>
-          </a:r>
-          <a:r>
-            <a:rPr lang="tr-TR" dirty="0" err="1"/>
-            <a:t>design</a:t>
+            <a:t>PCB Design</a:t>
           </a:r>
           <a:endParaRPr lang="en-US" dirty="0"/>
         </a:p>
@@ -1356,11 +1393,7 @@
           </a:r>
           <a:r>
             <a:rPr lang="tr-TR" dirty="0"/>
-            <a:t> </a:t>
-          </a:r>
-          <a:r>
-            <a:rPr lang="tr-TR" dirty="0" err="1"/>
-            <a:t>design</a:t>
+            <a:t> Design</a:t>
           </a:r>
           <a:endParaRPr lang="en-US" dirty="0"/>
         </a:p>
@@ -1388,6 +1421,88 @@
         </a:p>
       </dgm:t>
     </dgm:pt>
+    <dgm:pt modelId="{67A73ACF-41D5-4BB3-9184-1437BB472359}">
+      <dgm:prSet phldrT="[Metin]" phldr="1"/>
+      <dgm:spPr/>
+      <dgm:t>
+        <a:bodyPr/>
+        <a:lstStyle/>
+        <a:p>
+          <a:endParaRPr lang="en-US" dirty="0"/>
+        </a:p>
+      </dgm:t>
+    </dgm:pt>
+    <dgm:pt modelId="{4D15D847-177A-4A6C-BEC0-8FA5FA0B050E}" type="parTrans" cxnId="{B42FB8CD-B6C7-47AF-9106-7C2B79F0D7CE}">
+      <dgm:prSet/>
+      <dgm:spPr/>
+      <dgm:t>
+        <a:bodyPr/>
+        <a:lstStyle/>
+        <a:p>
+          <a:endParaRPr lang="en-US"/>
+        </a:p>
+      </dgm:t>
+    </dgm:pt>
+    <dgm:pt modelId="{0562E192-9F9C-4B6E-87EE-6EBA860E6510}" type="sibTrans" cxnId="{B42FB8CD-B6C7-47AF-9106-7C2B79F0D7CE}">
+      <dgm:prSet/>
+      <dgm:spPr/>
+      <dgm:t>
+        <a:bodyPr/>
+        <a:lstStyle/>
+        <a:p>
+          <a:endParaRPr lang="en-US"/>
+        </a:p>
+      </dgm:t>
+    </dgm:pt>
+    <dgm:pt modelId="{218C139B-AAA3-4FA3-B60C-06D95791E1E3}">
+      <dgm:prSet phldrT="[Metin]"/>
+      <dgm:spPr/>
+      <dgm:t>
+        <a:bodyPr/>
+        <a:lstStyle/>
+        <a:p>
+          <a:r>
+            <a:rPr lang="tr-TR" dirty="0" err="1"/>
+            <a:t>Cost</a:t>
+          </a:r>
+          <a:r>
+            <a:rPr lang="tr-TR" dirty="0"/>
+            <a:t> of </a:t>
+          </a:r>
+          <a:r>
+            <a:rPr lang="tr-TR" dirty="0" err="1"/>
+            <a:t>the</a:t>
+          </a:r>
+          <a:r>
+            <a:rPr lang="tr-TR" dirty="0"/>
+            <a:t> Design</a:t>
+          </a:r>
+          <a:endParaRPr lang="en-US" dirty="0"/>
+        </a:p>
+      </dgm:t>
+    </dgm:pt>
+    <dgm:pt modelId="{642D769D-D2FF-45C0-A4F3-2159715BDBCE}" type="parTrans" cxnId="{8F8F4119-1B97-453B-84FF-ABB8163F9765}">
+      <dgm:prSet/>
+      <dgm:spPr/>
+      <dgm:t>
+        <a:bodyPr/>
+        <a:lstStyle/>
+        <a:p>
+          <a:endParaRPr lang="en-US"/>
+        </a:p>
+      </dgm:t>
+    </dgm:pt>
+    <dgm:pt modelId="{93863C4E-FA9B-473F-B7B0-0E0FF90956CB}" type="sibTrans" cxnId="{8F8F4119-1B97-453B-84FF-ABB8163F9765}">
+      <dgm:prSet/>
+      <dgm:spPr/>
+      <dgm:t>
+        <a:bodyPr/>
+        <a:lstStyle/>
+        <a:p>
+          <a:endParaRPr lang="en-US"/>
+        </a:p>
+      </dgm:t>
+    </dgm:pt>
     <dgm:pt modelId="{73895ED3-1570-4634-85A0-BD89A4B5C49C}" type="pres">
       <dgm:prSet presAssocID="{A87CBE85-FA28-4ACF-874C-4D0A0CBA159E}" presName="linearFlow" presStyleCnt="0">
         <dgm:presLayoutVars>
@@ -1403,7 +1518,7 @@
       <dgm:spPr/>
     </dgm:pt>
     <dgm:pt modelId="{179439C4-8028-4BCF-8DB8-7CB78191C3B4}" type="pres">
-      <dgm:prSet presAssocID="{10354C56-A454-4AED-8DC4-6C813E183F1D}" presName="parentText" presStyleLbl="alignNode1" presStyleIdx="0" presStyleCnt="5">
+      <dgm:prSet presAssocID="{10354C56-A454-4AED-8DC4-6C813E183F1D}" presName="parentText" presStyleLbl="alignNode1" presStyleIdx="0" presStyleCnt="6">
         <dgm:presLayoutVars>
           <dgm:chMax val="1"/>
           <dgm:bulletEnabled val="1"/>
@@ -1412,7 +1527,7 @@
       <dgm:spPr/>
     </dgm:pt>
     <dgm:pt modelId="{C856F650-2FCE-4956-8313-EA9AFBB23901}" type="pres">
-      <dgm:prSet presAssocID="{10354C56-A454-4AED-8DC4-6C813E183F1D}" presName="descendantText" presStyleLbl="alignAcc1" presStyleIdx="0" presStyleCnt="5">
+      <dgm:prSet presAssocID="{10354C56-A454-4AED-8DC4-6C813E183F1D}" presName="descendantText" presStyleLbl="alignAcc1" presStyleIdx="0" presStyleCnt="6">
         <dgm:presLayoutVars>
           <dgm:bulletEnabled val="1"/>
         </dgm:presLayoutVars>
@@ -1428,7 +1543,7 @@
       <dgm:spPr/>
     </dgm:pt>
     <dgm:pt modelId="{EF48A7C1-1A3D-4136-8958-7A50F1BE7EF1}" type="pres">
-      <dgm:prSet presAssocID="{53638A30-4519-4465-9129-12ED44CE7A15}" presName="parentText" presStyleLbl="alignNode1" presStyleIdx="1" presStyleCnt="5">
+      <dgm:prSet presAssocID="{53638A30-4519-4465-9129-12ED44CE7A15}" presName="parentText" presStyleLbl="alignNode1" presStyleIdx="1" presStyleCnt="6">
         <dgm:presLayoutVars>
           <dgm:chMax val="1"/>
           <dgm:bulletEnabled val="1"/>
@@ -1437,7 +1552,7 @@
       <dgm:spPr/>
     </dgm:pt>
     <dgm:pt modelId="{8E3A7501-C9AA-4DA4-8375-BF5B251581B5}" type="pres">
-      <dgm:prSet presAssocID="{53638A30-4519-4465-9129-12ED44CE7A15}" presName="descendantText" presStyleLbl="alignAcc1" presStyleIdx="1" presStyleCnt="5">
+      <dgm:prSet presAssocID="{53638A30-4519-4465-9129-12ED44CE7A15}" presName="descendantText" presStyleLbl="alignAcc1" presStyleIdx="1" presStyleCnt="6">
         <dgm:presLayoutVars>
           <dgm:bulletEnabled val="1"/>
         </dgm:presLayoutVars>
@@ -1453,7 +1568,7 @@
       <dgm:spPr/>
     </dgm:pt>
     <dgm:pt modelId="{DDFA9597-28E1-491A-9164-194FBD4C4B14}" type="pres">
-      <dgm:prSet presAssocID="{5B709980-D857-42E4-BA98-1BEB0900B08B}" presName="parentText" presStyleLbl="alignNode1" presStyleIdx="2" presStyleCnt="5">
+      <dgm:prSet presAssocID="{5B709980-D857-42E4-BA98-1BEB0900B08B}" presName="parentText" presStyleLbl="alignNode1" presStyleIdx="2" presStyleCnt="6">
         <dgm:presLayoutVars>
           <dgm:chMax val="1"/>
           <dgm:bulletEnabled val="1"/>
@@ -1462,7 +1577,7 @@
       <dgm:spPr/>
     </dgm:pt>
     <dgm:pt modelId="{BD3EFECB-C236-4129-BD33-1C1D38B52213}" type="pres">
-      <dgm:prSet presAssocID="{5B709980-D857-42E4-BA98-1BEB0900B08B}" presName="descendantText" presStyleLbl="alignAcc1" presStyleIdx="2" presStyleCnt="5">
+      <dgm:prSet presAssocID="{5B709980-D857-42E4-BA98-1BEB0900B08B}" presName="descendantText" presStyleLbl="alignAcc1" presStyleIdx="2" presStyleCnt="6">
         <dgm:presLayoutVars>
           <dgm:bulletEnabled val="1"/>
         </dgm:presLayoutVars>
@@ -1478,7 +1593,7 @@
       <dgm:spPr/>
     </dgm:pt>
     <dgm:pt modelId="{07CE9556-44C4-4878-B3C7-63C7B1995141}" type="pres">
-      <dgm:prSet presAssocID="{EC0F5FBC-D656-4B24-AC92-BA4582C07CFB}" presName="parentText" presStyleLbl="alignNode1" presStyleIdx="3" presStyleCnt="5">
+      <dgm:prSet presAssocID="{EC0F5FBC-D656-4B24-AC92-BA4582C07CFB}" presName="parentText" presStyleLbl="alignNode1" presStyleIdx="3" presStyleCnt="6">
         <dgm:presLayoutVars>
           <dgm:chMax val="1"/>
           <dgm:bulletEnabled val="1"/>
@@ -1487,7 +1602,7 @@
       <dgm:spPr/>
     </dgm:pt>
     <dgm:pt modelId="{A9C83228-984A-447C-B89B-00CA3B232D70}" type="pres">
-      <dgm:prSet presAssocID="{EC0F5FBC-D656-4B24-AC92-BA4582C07CFB}" presName="descendantText" presStyleLbl="alignAcc1" presStyleIdx="3" presStyleCnt="5">
+      <dgm:prSet presAssocID="{EC0F5FBC-D656-4B24-AC92-BA4582C07CFB}" presName="descendantText" presStyleLbl="alignAcc1" presStyleIdx="3" presStyleCnt="6">
         <dgm:presLayoutVars>
           <dgm:bulletEnabled val="1"/>
         </dgm:presLayoutVars>
@@ -1503,7 +1618,7 @@
       <dgm:spPr/>
     </dgm:pt>
     <dgm:pt modelId="{F89AF593-B4F0-4F03-BBA9-C0790D51D738}" type="pres">
-      <dgm:prSet presAssocID="{C7C1E5B0-B849-4DAD-BA08-589148EC939C}" presName="parentText" presStyleLbl="alignNode1" presStyleIdx="4" presStyleCnt="5">
+      <dgm:prSet presAssocID="{C7C1E5B0-B849-4DAD-BA08-589148EC939C}" presName="parentText" presStyleLbl="alignNode1" presStyleIdx="4" presStyleCnt="6">
         <dgm:presLayoutVars>
           <dgm:chMax val="1"/>
           <dgm:bulletEnabled val="1"/>
@@ -1512,7 +1627,32 @@
       <dgm:spPr/>
     </dgm:pt>
     <dgm:pt modelId="{A231222F-16DA-4713-81B7-068498D9703A}" type="pres">
-      <dgm:prSet presAssocID="{C7C1E5B0-B849-4DAD-BA08-589148EC939C}" presName="descendantText" presStyleLbl="alignAcc1" presStyleIdx="4" presStyleCnt="5">
+      <dgm:prSet presAssocID="{C7C1E5B0-B849-4DAD-BA08-589148EC939C}" presName="descendantText" presStyleLbl="alignAcc1" presStyleIdx="4" presStyleCnt="6">
+        <dgm:presLayoutVars>
+          <dgm:bulletEnabled val="1"/>
+        </dgm:presLayoutVars>
+      </dgm:prSet>
+      <dgm:spPr/>
+    </dgm:pt>
+    <dgm:pt modelId="{3D9E62D9-B37E-476A-9821-F3C09D19392E}" type="pres">
+      <dgm:prSet presAssocID="{3AE8C7BB-EB78-4D4B-BBF4-164211C71106}" presName="sp" presStyleCnt="0"/>
+      <dgm:spPr/>
+    </dgm:pt>
+    <dgm:pt modelId="{5C69E8D1-0909-40C5-A9B2-ACACE15F006B}" type="pres">
+      <dgm:prSet presAssocID="{67A73ACF-41D5-4BB3-9184-1437BB472359}" presName="composite" presStyleCnt="0"/>
+      <dgm:spPr/>
+    </dgm:pt>
+    <dgm:pt modelId="{462B3B94-857D-4590-9894-CD8333721185}" type="pres">
+      <dgm:prSet presAssocID="{67A73ACF-41D5-4BB3-9184-1437BB472359}" presName="parentText" presStyleLbl="alignNode1" presStyleIdx="5" presStyleCnt="6">
+        <dgm:presLayoutVars>
+          <dgm:chMax val="1"/>
+          <dgm:bulletEnabled val="1"/>
+        </dgm:presLayoutVars>
+      </dgm:prSet>
+      <dgm:spPr/>
+    </dgm:pt>
+    <dgm:pt modelId="{90BAFE1B-ADE6-4427-BCE4-1AAA0F97C898}" type="pres">
+      <dgm:prSet presAssocID="{67A73ACF-41D5-4BB3-9184-1437BB472359}" presName="descendantText" presStyleLbl="alignAcc1" presStyleIdx="5" presStyleCnt="6">
         <dgm:presLayoutVars>
           <dgm:bulletEnabled val="1"/>
         </dgm:presLayoutVars>
@@ -1521,7 +1661,9 @@
     </dgm:pt>
   </dgm:ptLst>
   <dgm:cxnLst>
+    <dgm:cxn modelId="{5B1A7F0A-1E45-4126-AE7F-519EAF783CA3}" type="presOf" srcId="{218C139B-AAA3-4FA3-B60C-06D95791E1E3}" destId="{90BAFE1B-ADE6-4427-BCE4-1AAA0F97C898}" srcOrd="0" destOrd="0" presId="urn:microsoft.com/office/officeart/2005/8/layout/chevron2"/>
     <dgm:cxn modelId="{9CA7B60B-A98E-45C1-9E05-5C643E5B270C}" srcId="{A87CBE85-FA28-4ACF-874C-4D0A0CBA159E}" destId="{EC0F5FBC-D656-4B24-AC92-BA4582C07CFB}" srcOrd="3" destOrd="0" parTransId="{DB37B95C-2680-4665-B58C-A4A15090C6C7}" sibTransId="{C531348A-E9D4-4766-B40F-4E5B9B547844}"/>
+    <dgm:cxn modelId="{8F8F4119-1B97-453B-84FF-ABB8163F9765}" srcId="{67A73ACF-41D5-4BB3-9184-1437BB472359}" destId="{218C139B-AAA3-4FA3-B60C-06D95791E1E3}" srcOrd="0" destOrd="0" parTransId="{642D769D-D2FF-45C0-A4F3-2159715BDBCE}" sibTransId="{93863C4E-FA9B-473F-B7B0-0E0FF90956CB}"/>
     <dgm:cxn modelId="{4AB47B1A-5F48-4460-B72F-A600D53B302C}" srcId="{A87CBE85-FA28-4ACF-874C-4D0A0CBA159E}" destId="{53638A30-4519-4465-9129-12ED44CE7A15}" srcOrd="1" destOrd="0" parTransId="{FA2CED3E-7D56-4457-B1CD-7E24D00E2F58}" sibTransId="{A3EA595B-0A80-480B-AD63-A37C9EA0ECFD}"/>
     <dgm:cxn modelId="{7741F244-26FC-495D-B5DD-59ECC6F1EFF6}" type="presOf" srcId="{EC0F5FBC-D656-4B24-AC92-BA4582C07CFB}" destId="{07CE9556-44C4-4878-B3C7-63C7B1995141}" srcOrd="0" destOrd="0" presId="urn:microsoft.com/office/officeart/2005/8/layout/chevron2"/>
     <dgm:cxn modelId="{8DE10469-3206-4467-BCB0-DAA5F994E47B}" srcId="{53638A30-4519-4465-9129-12ED44CE7A15}" destId="{6695DD34-D64C-41EF-8CA6-E080E1441DB6}" srcOrd="0" destOrd="0" parTransId="{B8B96B8F-D283-428A-828C-2DDA7358C609}" sibTransId="{5484CF22-2271-45E2-8355-FC1C9761D55A}"/>
@@ -1536,6 +1678,8 @@
     <dgm:cxn modelId="{16D9B89E-FF5D-4444-A871-A2065AF3AE39}" type="presOf" srcId="{4D4B7B15-1AD7-4296-AA10-F2BB266A6977}" destId="{A9C83228-984A-447C-B89B-00CA3B232D70}" srcOrd="0" destOrd="0" presId="urn:microsoft.com/office/officeart/2005/8/layout/chevron2"/>
     <dgm:cxn modelId="{07780CC2-B849-41A3-8870-DBC904487AA2}" type="presOf" srcId="{32EAE2E2-F590-4E2E-A4D0-65C1973C3FD9}" destId="{A231222F-16DA-4713-81B7-068498D9703A}" srcOrd="0" destOrd="0" presId="urn:microsoft.com/office/officeart/2005/8/layout/chevron2"/>
     <dgm:cxn modelId="{388C54C3-1AE3-4BCC-BA3E-95C344F2D914}" srcId="{A87CBE85-FA28-4ACF-874C-4D0A0CBA159E}" destId="{5B709980-D857-42E4-BA98-1BEB0900B08B}" srcOrd="2" destOrd="0" parTransId="{7A5F0A0E-F65C-434C-973F-275EF90A039F}" sibTransId="{2A016D60-0CA2-4915-BAF0-C66ACD255938}"/>
+    <dgm:cxn modelId="{B42FB8CD-B6C7-47AF-9106-7C2B79F0D7CE}" srcId="{A87CBE85-FA28-4ACF-874C-4D0A0CBA159E}" destId="{67A73ACF-41D5-4BB3-9184-1437BB472359}" srcOrd="5" destOrd="0" parTransId="{4D15D847-177A-4A6C-BEC0-8FA5FA0B050E}" sibTransId="{0562E192-9F9C-4B6E-87EE-6EBA860E6510}"/>
+    <dgm:cxn modelId="{60B7ADD1-4205-4549-8BE1-701B9848768C}" type="presOf" srcId="{67A73ACF-41D5-4BB3-9184-1437BB472359}" destId="{462B3B94-857D-4590-9894-CD8333721185}" srcOrd="0" destOrd="0" presId="urn:microsoft.com/office/officeart/2005/8/layout/chevron2"/>
     <dgm:cxn modelId="{3A75A8D2-14A9-4B2F-9950-06B82BA06B67}" type="presOf" srcId="{6695DD34-D64C-41EF-8CA6-E080E1441DB6}" destId="{8E3A7501-C9AA-4DA4-8375-BF5B251581B5}" srcOrd="0" destOrd="0" presId="urn:microsoft.com/office/officeart/2005/8/layout/chevron2"/>
     <dgm:cxn modelId="{9AFFA2D8-CAB4-4118-B572-70251648B55C}" type="presOf" srcId="{C7C1E5B0-B849-4DAD-BA08-589148EC939C}" destId="{F89AF593-B4F0-4F03-BBA9-C0790D51D738}" srcOrd="0" destOrd="0" presId="urn:microsoft.com/office/officeart/2005/8/layout/chevron2"/>
     <dgm:cxn modelId="{EA0C61DF-BC1F-402A-8E8E-8FB31F5C46C9}" srcId="{EC0F5FBC-D656-4B24-AC92-BA4582C07CFB}" destId="{4D4B7B15-1AD7-4296-AA10-F2BB266A6977}" srcOrd="0" destOrd="0" parTransId="{01B87144-F89E-4C5E-9F91-C5C75E12C005}" sibTransId="{282C954F-2956-4FB4-96DA-033998BB554D}"/>
@@ -1561,6 +1705,10 @@
     <dgm:cxn modelId="{8EA1F919-675A-43D9-8E0D-10D2A4081F0B}" type="presParOf" srcId="{73895ED3-1570-4634-85A0-BD89A4B5C49C}" destId="{9C729AE6-B91A-48CC-B838-324DD1E2EB2D}" srcOrd="8" destOrd="0" presId="urn:microsoft.com/office/officeart/2005/8/layout/chevron2"/>
     <dgm:cxn modelId="{058E0D0F-BF3D-4EE7-B40C-734F86ADB086}" type="presParOf" srcId="{9C729AE6-B91A-48CC-B838-324DD1E2EB2D}" destId="{F89AF593-B4F0-4F03-BBA9-C0790D51D738}" srcOrd="0" destOrd="0" presId="urn:microsoft.com/office/officeart/2005/8/layout/chevron2"/>
     <dgm:cxn modelId="{64A78D69-6ED6-4B67-9D40-C643702D93F9}" type="presParOf" srcId="{9C729AE6-B91A-48CC-B838-324DD1E2EB2D}" destId="{A231222F-16DA-4713-81B7-068498D9703A}" srcOrd="1" destOrd="0" presId="urn:microsoft.com/office/officeart/2005/8/layout/chevron2"/>
+    <dgm:cxn modelId="{EB3E32EF-F4C7-4326-9D00-E7CF5DF497A9}" type="presParOf" srcId="{73895ED3-1570-4634-85A0-BD89A4B5C49C}" destId="{3D9E62D9-B37E-476A-9821-F3C09D19392E}" srcOrd="9" destOrd="0" presId="urn:microsoft.com/office/officeart/2005/8/layout/chevron2"/>
+    <dgm:cxn modelId="{62D1511B-90A4-46C4-A914-76816238050D}" type="presParOf" srcId="{73895ED3-1570-4634-85A0-BD89A4B5C49C}" destId="{5C69E8D1-0909-40C5-A9B2-ACACE15F006B}" srcOrd="10" destOrd="0" presId="urn:microsoft.com/office/officeart/2005/8/layout/chevron2"/>
+    <dgm:cxn modelId="{7C30D08B-9E11-4552-AE0C-F5661993719A}" type="presParOf" srcId="{5C69E8D1-0909-40C5-A9B2-ACACE15F006B}" destId="{462B3B94-857D-4590-9894-CD8333721185}" srcOrd="0" destOrd="0" presId="urn:microsoft.com/office/officeart/2005/8/layout/chevron2"/>
+    <dgm:cxn modelId="{063FA74F-3126-45B5-A061-CE92E6C26AFF}" type="presParOf" srcId="{5C69E8D1-0909-40C5-A9B2-ACACE15F006B}" destId="{90BAFE1B-ADE6-4427-BCE4-1AAA0F97C898}" srcOrd="1" destOrd="0" presId="urn:microsoft.com/office/officeart/2005/8/layout/chevron2"/>
   </dgm:cxnLst>
   <dgm:bg/>
   <dgm:whole/>
@@ -1587,8 +1735,8 @@
       </dsp:nvSpPr>
       <dsp:spPr>
         <a:xfrm rot="5400000">
-          <a:off x="-136177" y="137878"/>
-          <a:ext cx="907851" cy="635496"/>
+          <a:off x="-114002" y="116401"/>
+          <a:ext cx="760015" cy="532010"/>
         </a:xfrm>
         <a:prstGeom prst="chevron">
           <a:avLst/>
@@ -1672,12 +1820,12 @@
         </a:fontRef>
       </dsp:style>
       <dsp:txBody>
-        <a:bodyPr spcFirstLastPara="0" vert="horz" wrap="square" lIns="8890" tIns="8890" rIns="8890" bIns="8890" numCol="1" spcCol="1270" anchor="ctr" anchorCtr="0">
+        <a:bodyPr spcFirstLastPara="0" vert="horz" wrap="square" lIns="7620" tIns="7620" rIns="7620" bIns="7620" numCol="1" spcCol="1270" anchor="ctr" anchorCtr="0">
           <a:noAutofit/>
         </a:bodyPr>
         <a:lstStyle/>
         <a:p>
-          <a:pPr marL="0" lvl="0" indent="0" algn="ctr" defTabSz="622300">
+          <a:pPr marL="0" lvl="0" indent="0" algn="ctr" defTabSz="533400">
             <a:lnSpc>
               <a:spcPct val="90000"/>
             </a:lnSpc>
@@ -1689,12 +1837,12 @@
             </a:spcAft>
             <a:buNone/>
           </a:pPr>
-          <a:endParaRPr lang="en-US" sz="1400" kern="1200" dirty="0"/>
+          <a:endParaRPr lang="en-US" sz="1200" kern="1200" dirty="0"/>
         </a:p>
       </dsp:txBody>
       <dsp:txXfrm rot="-5400000">
-        <a:off x="1" y="319448"/>
-        <a:ext cx="635496" cy="272355"/>
+        <a:off x="1" y="268403"/>
+        <a:ext cx="532010" cy="228005"/>
       </dsp:txXfrm>
     </dsp:sp>
     <dsp:sp modelId="{C856F650-2FCE-4956-8313-EA9AFBB23901}">
@@ -1704,8 +1852,8 @@
       </dsp:nvSpPr>
       <dsp:spPr>
         <a:xfrm rot="5400000">
-          <a:off x="3070696" y="-2433499"/>
-          <a:ext cx="590103" cy="5460503"/>
+          <a:off x="3067000" y="-2532590"/>
+          <a:ext cx="494010" cy="5563989"/>
         </a:xfrm>
         <a:prstGeom prst="round2SameRect">
           <a:avLst/>
@@ -1772,12 +1920,12 @@
         <a:fontRef idx="minor"/>
       </dsp:style>
       <dsp:txBody>
-        <a:bodyPr spcFirstLastPara="0" vert="horz" wrap="square" lIns="241808" tIns="21590" rIns="21590" bIns="21590" numCol="1" spcCol="1270" anchor="ctr" anchorCtr="0">
+        <a:bodyPr spcFirstLastPara="0" vert="horz" wrap="square" lIns="142240" tIns="12700" rIns="12700" bIns="12700" numCol="1" spcCol="1270" anchor="ctr" anchorCtr="0">
           <a:noAutofit/>
         </a:bodyPr>
         <a:lstStyle/>
         <a:p>
-          <a:pPr marL="285750" lvl="1" indent="-285750" algn="l" defTabSz="1511300">
+          <a:pPr marL="228600" lvl="1" indent="-228600" algn="l" defTabSz="889000">
             <a:lnSpc>
               <a:spcPct val="90000"/>
             </a:lnSpc>
@@ -1790,23 +1938,23 @@
             <a:buChar char="•"/>
           </a:pPr>
           <a:r>
-            <a:rPr lang="tr-TR" sz="3400" kern="1200" dirty="0" err="1"/>
+            <a:rPr lang="tr-TR" sz="2000" kern="1200" dirty="0" err="1"/>
             <a:t>Topology</a:t>
           </a:r>
           <a:r>
-            <a:rPr lang="tr-TR" sz="3400" kern="1200" dirty="0"/>
+            <a:rPr lang="tr-TR" sz="2000" kern="1200" dirty="0"/>
             <a:t> </a:t>
           </a:r>
           <a:r>
-            <a:rPr lang="tr-TR" sz="3400" kern="1200" dirty="0" err="1"/>
-            <a:t>selection</a:t>
+            <a:rPr lang="tr-TR" sz="2000" kern="1200" dirty="0" err="1"/>
+            <a:t>Selection</a:t>
           </a:r>
-          <a:endParaRPr lang="en-US" sz="3400" kern="1200" dirty="0"/>
+          <a:endParaRPr lang="en-US" sz="2000" kern="1200" dirty="0"/>
         </a:p>
       </dsp:txBody>
       <dsp:txXfrm rot="-5400000">
-        <a:off x="635496" y="30507"/>
-        <a:ext cx="5431697" cy="532491"/>
+        <a:off x="532011" y="26515"/>
+        <a:ext cx="5539873" cy="445778"/>
       </dsp:txXfrm>
     </dsp:sp>
     <dsp:sp modelId="{EF48A7C1-1A3D-4136-8958-7A50F1BE7EF1}">
@@ -1816,8 +1964,8 @@
       </dsp:nvSpPr>
       <dsp:spPr>
         <a:xfrm rot="5400000">
-          <a:off x="-136177" y="926065"/>
-          <a:ext cx="907851" cy="635496"/>
+          <a:off x="-114002" y="776238"/>
+          <a:ext cx="760015" cy="532010"/>
         </a:xfrm>
         <a:prstGeom prst="chevron">
           <a:avLst/>
@@ -1901,12 +2049,12 @@
         </a:fontRef>
       </dsp:style>
       <dsp:txBody>
-        <a:bodyPr spcFirstLastPara="0" vert="horz" wrap="square" lIns="8890" tIns="8890" rIns="8890" bIns="8890" numCol="1" spcCol="1270" anchor="ctr" anchorCtr="0">
+        <a:bodyPr spcFirstLastPara="0" vert="horz" wrap="square" lIns="7620" tIns="7620" rIns="7620" bIns="7620" numCol="1" spcCol="1270" anchor="ctr" anchorCtr="0">
           <a:noAutofit/>
         </a:bodyPr>
         <a:lstStyle/>
         <a:p>
-          <a:pPr marL="0" lvl="0" indent="0" algn="ctr" defTabSz="622300">
+          <a:pPr marL="0" lvl="0" indent="0" algn="ctr" defTabSz="533400">
             <a:lnSpc>
               <a:spcPct val="90000"/>
             </a:lnSpc>
@@ -1918,12 +2066,12 @@
             </a:spcAft>
             <a:buNone/>
           </a:pPr>
-          <a:endParaRPr lang="en-US" sz="1400" kern="1200" dirty="0"/>
+          <a:endParaRPr lang="en-US" sz="1200" kern="1200" dirty="0"/>
         </a:p>
       </dsp:txBody>
       <dsp:txXfrm rot="-5400000">
-        <a:off x="1" y="1107635"/>
-        <a:ext cx="635496" cy="272355"/>
+        <a:off x="1" y="928240"/>
+        <a:ext cx="532010" cy="228005"/>
       </dsp:txXfrm>
     </dsp:sp>
     <dsp:sp modelId="{8E3A7501-C9AA-4DA4-8375-BF5B251581B5}">
@@ -1933,8 +2081,8 @@
       </dsp:nvSpPr>
       <dsp:spPr>
         <a:xfrm rot="5400000">
-          <a:off x="3070696" y="-1645312"/>
-          <a:ext cx="590103" cy="5460503"/>
+          <a:off x="3067000" y="-1872753"/>
+          <a:ext cx="494010" cy="5563989"/>
         </a:xfrm>
         <a:prstGeom prst="round2SameRect">
           <a:avLst/>
@@ -2001,12 +2149,12 @@
         <a:fontRef idx="minor"/>
       </dsp:style>
       <dsp:txBody>
-        <a:bodyPr spcFirstLastPara="0" vert="horz" wrap="square" lIns="241808" tIns="21590" rIns="21590" bIns="21590" numCol="1" spcCol="1270" anchor="ctr" anchorCtr="0">
+        <a:bodyPr spcFirstLastPara="0" vert="horz" wrap="square" lIns="142240" tIns="12700" rIns="12700" bIns="12700" numCol="1" spcCol="1270" anchor="ctr" anchorCtr="0">
           <a:noAutofit/>
         </a:bodyPr>
         <a:lstStyle/>
         <a:p>
-          <a:pPr marL="285750" lvl="1" indent="-285750" algn="l" defTabSz="1511300">
+          <a:pPr marL="228600" lvl="1" indent="-228600" algn="l" defTabSz="889000">
             <a:lnSpc>
               <a:spcPct val="90000"/>
             </a:lnSpc>
@@ -2019,23 +2167,19 @@
             <a:buChar char="•"/>
           </a:pPr>
           <a:r>
-            <a:rPr lang="tr-TR" sz="3400" kern="1200" dirty="0" err="1"/>
+            <a:rPr lang="tr-TR" sz="2000" kern="1200" dirty="0" err="1"/>
             <a:t>Magnetic</a:t>
           </a:r>
           <a:r>
-            <a:rPr lang="tr-TR" sz="3400" kern="1200" dirty="0"/>
-            <a:t> </a:t>
+            <a:rPr lang="tr-TR" sz="2000" kern="1200" dirty="0"/>
+            <a:t> Design</a:t>
           </a:r>
-          <a:r>
-            <a:rPr lang="tr-TR" sz="3400" kern="1200" dirty="0" err="1"/>
-            <a:t>design</a:t>
-          </a:r>
-          <a:endParaRPr lang="en-US" sz="3400" kern="1200" dirty="0"/>
+          <a:endParaRPr lang="en-US" sz="2000" kern="1200" dirty="0"/>
         </a:p>
       </dsp:txBody>
       <dsp:txXfrm rot="-5400000">
-        <a:off x="635496" y="818694"/>
-        <a:ext cx="5431697" cy="532491"/>
+        <a:off x="532011" y="686352"/>
+        <a:ext cx="5539873" cy="445778"/>
       </dsp:txXfrm>
     </dsp:sp>
     <dsp:sp modelId="{DDFA9597-28E1-491A-9164-194FBD4C4B14}">
@@ -2045,8 +2189,8 @@
       </dsp:nvSpPr>
       <dsp:spPr>
         <a:xfrm rot="5400000">
-          <a:off x="-136177" y="1714251"/>
-          <a:ext cx="907851" cy="635496"/>
+          <a:off x="-114002" y="1436075"/>
+          <a:ext cx="760015" cy="532010"/>
         </a:xfrm>
         <a:prstGeom prst="chevron">
           <a:avLst/>
@@ -2130,12 +2274,12 @@
         </a:fontRef>
       </dsp:style>
       <dsp:txBody>
-        <a:bodyPr spcFirstLastPara="0" vert="horz" wrap="square" lIns="8890" tIns="8890" rIns="8890" bIns="8890" numCol="1" spcCol="1270" anchor="ctr" anchorCtr="0">
+        <a:bodyPr spcFirstLastPara="0" vert="horz" wrap="square" lIns="7620" tIns="7620" rIns="7620" bIns="7620" numCol="1" spcCol="1270" anchor="ctr" anchorCtr="0">
           <a:noAutofit/>
         </a:bodyPr>
         <a:lstStyle/>
         <a:p>
-          <a:pPr marL="0" lvl="0" indent="0" algn="ctr" defTabSz="622300">
+          <a:pPr marL="0" lvl="0" indent="0" algn="ctr" defTabSz="533400">
             <a:lnSpc>
               <a:spcPct val="90000"/>
             </a:lnSpc>
@@ -2147,12 +2291,12 @@
             </a:spcAft>
             <a:buNone/>
           </a:pPr>
-          <a:endParaRPr lang="en-US" sz="1400" kern="1200"/>
+          <a:endParaRPr lang="en-US" sz="1200" kern="1200"/>
         </a:p>
       </dsp:txBody>
       <dsp:txXfrm rot="-5400000">
-        <a:off x="1" y="1895821"/>
-        <a:ext cx="635496" cy="272355"/>
+        <a:off x="1" y="1588077"/>
+        <a:ext cx="532010" cy="228005"/>
       </dsp:txXfrm>
     </dsp:sp>
     <dsp:sp modelId="{BD3EFECB-C236-4129-BD33-1C1D38B52213}">
@@ -2162,8 +2306,8 @@
       </dsp:nvSpPr>
       <dsp:spPr>
         <a:xfrm rot="5400000">
-          <a:off x="3070696" y="-857125"/>
-          <a:ext cx="590103" cy="5460503"/>
+          <a:off x="3067000" y="-1212915"/>
+          <a:ext cx="494010" cy="5563989"/>
         </a:xfrm>
         <a:prstGeom prst="round2SameRect">
           <a:avLst/>
@@ -2230,12 +2374,12 @@
         <a:fontRef idx="minor"/>
       </dsp:style>
       <dsp:txBody>
-        <a:bodyPr spcFirstLastPara="0" vert="horz" wrap="square" lIns="241808" tIns="21590" rIns="21590" bIns="21590" numCol="1" spcCol="1270" anchor="ctr" anchorCtr="0">
+        <a:bodyPr spcFirstLastPara="0" vert="horz" wrap="square" lIns="142240" tIns="12700" rIns="12700" bIns="12700" numCol="1" spcCol="1270" anchor="ctr" anchorCtr="0">
           <a:noAutofit/>
         </a:bodyPr>
         <a:lstStyle/>
         <a:p>
-          <a:pPr marL="285750" lvl="1" indent="-285750" algn="l" defTabSz="1511300">
+          <a:pPr marL="228600" lvl="1" indent="-228600" algn="l" defTabSz="889000">
             <a:lnSpc>
               <a:spcPct val="90000"/>
             </a:lnSpc>
@@ -2248,19 +2392,43 @@
             <a:buChar char="•"/>
           </a:pPr>
           <a:r>
-            <a:rPr lang="tr-TR" sz="3400" kern="1200" dirty="0"/>
+            <a:rPr lang="tr-TR" sz="2000" kern="1200" dirty="0"/>
             <a:t>Component </a:t>
           </a:r>
           <a:r>
-            <a:rPr lang="tr-TR" sz="3400" kern="1200" dirty="0" err="1"/>
-            <a:t>selection</a:t>
+            <a:rPr lang="tr-TR" sz="2000" kern="1200" dirty="0" err="1"/>
+            <a:t>Selection</a:t>
           </a:r>
-          <a:endParaRPr lang="en-US" sz="3400" kern="1200" dirty="0"/>
+          <a:r>
+            <a:rPr lang="tr-TR" sz="2000" kern="1200" dirty="0"/>
+            <a:t> </a:t>
+          </a:r>
+          <a:r>
+            <a:rPr lang="tr-TR" sz="2000" kern="1200" dirty="0" err="1"/>
+            <a:t>and</a:t>
+          </a:r>
+          <a:r>
+            <a:rPr lang="tr-TR" sz="2000" kern="1200" dirty="0"/>
+            <a:t> </a:t>
+          </a:r>
+          <a:r>
+            <a:rPr lang="tr-TR" sz="2000" kern="1200" dirty="0" err="1"/>
+            <a:t>Simulation</a:t>
+          </a:r>
+          <a:r>
+            <a:rPr lang="tr-TR" sz="2000" kern="1200" dirty="0"/>
+            <a:t> </a:t>
+          </a:r>
+          <a:r>
+            <a:rPr lang="tr-TR" sz="2000" kern="1200" dirty="0" err="1"/>
+            <a:t>Results</a:t>
+          </a:r>
+          <a:endParaRPr lang="en-US" sz="2000" kern="1200" dirty="0"/>
         </a:p>
       </dsp:txBody>
       <dsp:txXfrm rot="-5400000">
-        <a:off x="635496" y="1606881"/>
-        <a:ext cx="5431697" cy="532491"/>
+        <a:off x="532011" y="1346190"/>
+        <a:ext cx="5539873" cy="445778"/>
       </dsp:txXfrm>
     </dsp:sp>
     <dsp:sp modelId="{07CE9556-44C4-4878-B3C7-63C7B1995141}">
@@ -2270,8 +2438,8 @@
       </dsp:nvSpPr>
       <dsp:spPr>
         <a:xfrm rot="5400000">
-          <a:off x="-136177" y="2502438"/>
-          <a:ext cx="907851" cy="635496"/>
+          <a:off x="-114002" y="2095913"/>
+          <a:ext cx="760015" cy="532010"/>
         </a:xfrm>
         <a:prstGeom prst="chevron">
           <a:avLst/>
@@ -2355,12 +2523,12 @@
         </a:fontRef>
       </dsp:style>
       <dsp:txBody>
-        <a:bodyPr spcFirstLastPara="0" vert="horz" wrap="square" lIns="8890" tIns="8890" rIns="8890" bIns="8890" numCol="1" spcCol="1270" anchor="ctr" anchorCtr="0">
+        <a:bodyPr spcFirstLastPara="0" vert="horz" wrap="square" lIns="7620" tIns="7620" rIns="7620" bIns="7620" numCol="1" spcCol="1270" anchor="ctr" anchorCtr="0">
           <a:noAutofit/>
         </a:bodyPr>
         <a:lstStyle/>
         <a:p>
-          <a:pPr marL="0" lvl="0" indent="0" algn="ctr" defTabSz="622300">
+          <a:pPr marL="0" lvl="0" indent="0" algn="ctr" defTabSz="533400">
             <a:lnSpc>
               <a:spcPct val="90000"/>
             </a:lnSpc>
@@ -2372,12 +2540,12 @@
             </a:spcAft>
             <a:buNone/>
           </a:pPr>
-          <a:endParaRPr lang="en-US" sz="1400" kern="1200"/>
+          <a:endParaRPr lang="en-US" sz="1200" kern="1200"/>
         </a:p>
       </dsp:txBody>
       <dsp:txXfrm rot="-5400000">
-        <a:off x="1" y="2684008"/>
-        <a:ext cx="635496" cy="272355"/>
+        <a:off x="1" y="2247915"/>
+        <a:ext cx="532010" cy="228005"/>
       </dsp:txXfrm>
     </dsp:sp>
     <dsp:sp modelId="{A9C83228-984A-447C-B89B-00CA3B232D70}">
@@ -2387,8 +2555,8 @@
       </dsp:nvSpPr>
       <dsp:spPr>
         <a:xfrm rot="5400000">
-          <a:off x="3070696" y="-68939"/>
-          <a:ext cx="590103" cy="5460503"/>
+          <a:off x="3067000" y="-553078"/>
+          <a:ext cx="494010" cy="5563989"/>
         </a:xfrm>
         <a:prstGeom prst="round2SameRect">
           <a:avLst/>
@@ -2455,12 +2623,12 @@
         <a:fontRef idx="minor"/>
       </dsp:style>
       <dsp:txBody>
-        <a:bodyPr spcFirstLastPara="0" vert="horz" wrap="square" lIns="241808" tIns="21590" rIns="21590" bIns="21590" numCol="1" spcCol="1270" anchor="ctr" anchorCtr="0">
+        <a:bodyPr spcFirstLastPara="0" vert="horz" wrap="square" lIns="142240" tIns="12700" rIns="12700" bIns="12700" numCol="1" spcCol="1270" anchor="ctr" anchorCtr="0">
           <a:noAutofit/>
         </a:bodyPr>
         <a:lstStyle/>
         <a:p>
-          <a:pPr marL="285750" lvl="1" indent="-285750" algn="l" defTabSz="1511300">
+          <a:pPr marL="228600" lvl="1" indent="-228600" algn="l" defTabSz="889000">
             <a:lnSpc>
               <a:spcPct val="90000"/>
             </a:lnSpc>
@@ -2473,23 +2641,39 @@
             <a:buChar char="•"/>
           </a:pPr>
           <a:r>
-            <a:rPr lang="tr-TR" sz="3400" kern="1200" dirty="0" err="1"/>
-            <a:t>Simulation</a:t>
+            <a:rPr lang="tr-TR" sz="2000" kern="1200" dirty="0" err="1"/>
+            <a:t>Losses</a:t>
           </a:r>
           <a:r>
-            <a:rPr lang="tr-TR" sz="3400" kern="1200" dirty="0"/>
+            <a:rPr lang="tr-TR" sz="2000" kern="1200" dirty="0"/>
             <a:t> </a:t>
           </a:r>
           <a:r>
-            <a:rPr lang="tr-TR" sz="3400" kern="1200" dirty="0" err="1"/>
-            <a:t>results</a:t>
+            <a:rPr lang="tr-TR" sz="2000" kern="1200" dirty="0" err="1"/>
+            <a:t>and</a:t>
           </a:r>
-          <a:endParaRPr lang="en-US" sz="3400" kern="1200" dirty="0"/>
+          <a:r>
+            <a:rPr lang="tr-TR" sz="2000" kern="1200" dirty="0"/>
+            <a:t> </a:t>
+          </a:r>
+          <a:r>
+            <a:rPr lang="tr-TR" sz="2000" kern="1200" dirty="0" err="1"/>
+            <a:t>Thermal</a:t>
+          </a:r>
+          <a:r>
+            <a:rPr lang="tr-TR" sz="2000" kern="1200" dirty="0"/>
+            <a:t> </a:t>
+          </a:r>
+          <a:r>
+            <a:rPr lang="tr-TR" sz="2000" kern="1200" dirty="0" err="1"/>
+            <a:t>Results</a:t>
+          </a:r>
+          <a:endParaRPr lang="en-US" sz="2000" kern="1200" dirty="0"/>
         </a:p>
       </dsp:txBody>
       <dsp:txXfrm rot="-5400000">
-        <a:off x="635496" y="2395067"/>
-        <a:ext cx="5431697" cy="532491"/>
+        <a:off x="532011" y="2006027"/>
+        <a:ext cx="5539873" cy="445778"/>
       </dsp:txXfrm>
     </dsp:sp>
     <dsp:sp modelId="{F89AF593-B4F0-4F03-BBA9-C0790D51D738}">
@@ -2499,8 +2683,8 @@
       </dsp:nvSpPr>
       <dsp:spPr>
         <a:xfrm rot="5400000">
-          <a:off x="-136177" y="3290625"/>
-          <a:ext cx="907851" cy="635496"/>
+          <a:off x="-114002" y="2755750"/>
+          <a:ext cx="760015" cy="532010"/>
         </a:xfrm>
         <a:prstGeom prst="chevron">
           <a:avLst/>
@@ -2584,12 +2768,12 @@
         </a:fontRef>
       </dsp:style>
       <dsp:txBody>
-        <a:bodyPr spcFirstLastPara="0" vert="horz" wrap="square" lIns="8890" tIns="8890" rIns="8890" bIns="8890" numCol="1" spcCol="1270" anchor="ctr" anchorCtr="0">
+        <a:bodyPr spcFirstLastPara="0" vert="horz" wrap="square" lIns="7620" tIns="7620" rIns="7620" bIns="7620" numCol="1" spcCol="1270" anchor="ctr" anchorCtr="0">
           <a:noAutofit/>
         </a:bodyPr>
         <a:lstStyle/>
         <a:p>
-          <a:pPr marL="0" lvl="0" indent="0" algn="ctr" defTabSz="622300">
+          <a:pPr marL="0" lvl="0" indent="0" algn="ctr" defTabSz="533400">
             <a:lnSpc>
               <a:spcPct val="90000"/>
             </a:lnSpc>
@@ -2601,12 +2785,12 @@
             </a:spcAft>
             <a:buNone/>
           </a:pPr>
-          <a:endParaRPr lang="en-US" sz="1400" kern="1200"/>
+          <a:endParaRPr lang="en-US" sz="1200" kern="1200" dirty="0"/>
         </a:p>
       </dsp:txBody>
       <dsp:txXfrm rot="-5400000">
-        <a:off x="1" y="3472195"/>
-        <a:ext cx="635496" cy="272355"/>
+        <a:off x="1" y="2907752"/>
+        <a:ext cx="532010" cy="228005"/>
       </dsp:txXfrm>
     </dsp:sp>
     <dsp:sp modelId="{A231222F-16DA-4713-81B7-068498D9703A}">
@@ -2616,8 +2800,8 @@
       </dsp:nvSpPr>
       <dsp:spPr>
         <a:xfrm rot="5400000">
-          <a:off x="3070696" y="719247"/>
-          <a:ext cx="590103" cy="5460503"/>
+          <a:off x="3067000" y="106758"/>
+          <a:ext cx="494010" cy="5563989"/>
         </a:xfrm>
         <a:prstGeom prst="round2SameRect">
           <a:avLst/>
@@ -2684,12 +2868,12 @@
         <a:fontRef idx="minor"/>
       </dsp:style>
       <dsp:txBody>
-        <a:bodyPr spcFirstLastPara="0" vert="horz" wrap="square" lIns="241808" tIns="21590" rIns="21590" bIns="21590" numCol="1" spcCol="1270" anchor="ctr" anchorCtr="0">
+        <a:bodyPr spcFirstLastPara="0" vert="horz" wrap="square" lIns="142240" tIns="12700" rIns="12700" bIns="12700" numCol="1" spcCol="1270" anchor="ctr" anchorCtr="0">
           <a:noAutofit/>
         </a:bodyPr>
         <a:lstStyle/>
         <a:p>
-          <a:pPr marL="285750" lvl="1" indent="-285750" algn="l" defTabSz="1511300">
+          <a:pPr marL="228600" lvl="1" indent="-228600" algn="l" defTabSz="889000">
             <a:lnSpc>
               <a:spcPct val="90000"/>
             </a:lnSpc>
@@ -2702,19 +2886,248 @@
             <a:buChar char="•"/>
           </a:pPr>
           <a:r>
-            <a:rPr lang="tr-TR" sz="3400" kern="1200" dirty="0"/>
-            <a:t>PCB </a:t>
+            <a:rPr lang="tr-TR" sz="2000" kern="1200" dirty="0"/>
+            <a:t>PCB Design</a:t>
           </a:r>
-          <a:r>
-            <a:rPr lang="tr-TR" sz="3400" kern="1200" dirty="0" err="1"/>
-            <a:t>design</a:t>
-          </a:r>
-          <a:endParaRPr lang="en-US" sz="3400" kern="1200" dirty="0"/>
+          <a:endParaRPr lang="en-US" sz="2000" kern="1200" dirty="0"/>
         </a:p>
       </dsp:txBody>
       <dsp:txXfrm rot="-5400000">
-        <a:off x="635496" y="3183253"/>
-        <a:ext cx="5431697" cy="532491"/>
+        <a:off x="532011" y="2665863"/>
+        <a:ext cx="5539873" cy="445778"/>
+      </dsp:txXfrm>
+    </dsp:sp>
+    <dsp:sp modelId="{462B3B94-857D-4590-9894-CD8333721185}">
+      <dsp:nvSpPr>
+        <dsp:cNvPr id="0" name=""/>
+        <dsp:cNvSpPr/>
+      </dsp:nvSpPr>
+      <dsp:spPr>
+        <a:xfrm rot="5400000">
+          <a:off x="-114002" y="3415587"/>
+          <a:ext cx="760015" cy="532010"/>
+        </a:xfrm>
+        <a:prstGeom prst="chevron">
+          <a:avLst/>
+        </a:prstGeom>
+        <a:gradFill rotWithShape="0">
+          <a:gsLst>
+            <a:gs pos="0">
+              <a:schemeClr val="lt1">
+                <a:hueOff val="0"/>
+                <a:satOff val="0"/>
+                <a:lumOff val="0"/>
+                <a:alphaOff val="0"/>
+                <a:tint val="98000"/>
+                <a:shade val="25000"/>
+                <a:satMod val="250000"/>
+              </a:schemeClr>
+            </a:gs>
+            <a:gs pos="68000">
+              <a:schemeClr val="lt1">
+                <a:hueOff val="0"/>
+                <a:satOff val="0"/>
+                <a:lumOff val="0"/>
+                <a:alphaOff val="0"/>
+                <a:tint val="86000"/>
+                <a:satMod val="115000"/>
+              </a:schemeClr>
+            </a:gs>
+            <a:gs pos="100000">
+              <a:schemeClr val="lt1">
+                <a:hueOff val="0"/>
+                <a:satOff val="0"/>
+                <a:lumOff val="0"/>
+                <a:alphaOff val="0"/>
+                <a:tint val="50000"/>
+                <a:satMod val="150000"/>
+              </a:schemeClr>
+            </a:gs>
+          </a:gsLst>
+          <a:path path="circle">
+            <a:fillToRect l="50000" t="130000" r="50000" b="-30000"/>
+          </a:path>
+        </a:gradFill>
+        <a:ln>
+          <a:noFill/>
+        </a:ln>
+        <a:effectLst>
+          <a:outerShdw blurRad="57150" dist="38100" dir="5400000" algn="ctr" rotWithShape="0">
+            <a:schemeClr val="lt1">
+              <a:hueOff val="0"/>
+              <a:satOff val="0"/>
+              <a:lumOff val="0"/>
+              <a:alphaOff val="0"/>
+              <a:shade val="9000"/>
+              <a:satMod val="105000"/>
+              <a:alpha val="48000"/>
+            </a:schemeClr>
+          </a:outerShdw>
+        </a:effectLst>
+        <a:scene3d>
+          <a:camera prst="orthographicFront"/>
+          <a:lightRig rig="threePt" dir="t">
+            <a:rot lat="0" lon="0" rev="7500000"/>
+          </a:lightRig>
+        </a:scene3d>
+        <a:sp3d prstMaterial="plastic">
+          <a:bevelT w="127000" h="25400" prst="relaxedInset"/>
+        </a:sp3d>
+      </dsp:spPr>
+      <dsp:style>
+        <a:lnRef idx="0">
+          <a:scrgbClr r="0" g="0" b="0"/>
+        </a:lnRef>
+        <a:fillRef idx="3">
+          <a:scrgbClr r="0" g="0" b="0"/>
+        </a:fillRef>
+        <a:effectRef idx="2">
+          <a:scrgbClr r="0" g="0" b="0"/>
+        </a:effectRef>
+        <a:fontRef idx="minor">
+          <a:schemeClr val="lt1"/>
+        </a:fontRef>
+      </dsp:style>
+      <dsp:txBody>
+        <a:bodyPr spcFirstLastPara="0" vert="horz" wrap="square" lIns="7620" tIns="7620" rIns="7620" bIns="7620" numCol="1" spcCol="1270" anchor="ctr" anchorCtr="0">
+          <a:noAutofit/>
+        </a:bodyPr>
+        <a:lstStyle/>
+        <a:p>
+          <a:pPr marL="0" lvl="0" indent="0" algn="ctr" defTabSz="533400">
+            <a:lnSpc>
+              <a:spcPct val="90000"/>
+            </a:lnSpc>
+            <a:spcBef>
+              <a:spcPct val="0"/>
+            </a:spcBef>
+            <a:spcAft>
+              <a:spcPct val="35000"/>
+            </a:spcAft>
+            <a:buNone/>
+          </a:pPr>
+          <a:endParaRPr lang="en-US" sz="1200" kern="1200" dirty="0"/>
+        </a:p>
+      </dsp:txBody>
+      <dsp:txXfrm rot="-5400000">
+        <a:off x="1" y="3567589"/>
+        <a:ext cx="532010" cy="228005"/>
+      </dsp:txXfrm>
+    </dsp:sp>
+    <dsp:sp modelId="{90BAFE1B-ADE6-4427-BCE4-1AAA0F97C898}">
+      <dsp:nvSpPr>
+        <dsp:cNvPr id="0" name=""/>
+        <dsp:cNvSpPr/>
+      </dsp:nvSpPr>
+      <dsp:spPr>
+        <a:xfrm rot="5400000">
+          <a:off x="3067000" y="766595"/>
+          <a:ext cx="494010" cy="5563989"/>
+        </a:xfrm>
+        <a:prstGeom prst="round2SameRect">
+          <a:avLst/>
+        </a:prstGeom>
+        <a:solidFill>
+          <a:schemeClr val="dk1">
+            <a:alpha val="90000"/>
+            <a:tint val="40000"/>
+            <a:hueOff val="0"/>
+            <a:satOff val="0"/>
+            <a:lumOff val="0"/>
+            <a:alphaOff val="0"/>
+          </a:schemeClr>
+        </a:solidFill>
+        <a:ln w="9525" cap="flat" cmpd="sng" algn="ctr">
+          <a:solidFill>
+            <a:schemeClr val="dk1">
+              <a:hueOff val="0"/>
+              <a:satOff val="0"/>
+              <a:lumOff val="0"/>
+              <a:alphaOff val="0"/>
+            </a:schemeClr>
+          </a:solidFill>
+          <a:prstDash val="solid"/>
+        </a:ln>
+        <a:effectLst>
+          <a:outerShdw blurRad="57150" dist="38100" dir="5400000" algn="ctr" rotWithShape="0">
+            <a:schemeClr val="dk1">
+              <a:alpha val="90000"/>
+              <a:tint val="40000"/>
+              <a:hueOff val="0"/>
+              <a:satOff val="0"/>
+              <a:lumOff val="0"/>
+              <a:alphaOff val="0"/>
+              <a:shade val="9000"/>
+              <a:satMod val="105000"/>
+              <a:alpha val="48000"/>
+            </a:schemeClr>
+          </a:outerShdw>
+        </a:effectLst>
+        <a:scene3d>
+          <a:camera prst="orthographicFront"/>
+          <a:lightRig rig="threePt" dir="t">
+            <a:rot lat="0" lon="0" rev="7500000"/>
+          </a:lightRig>
+        </a:scene3d>
+        <a:sp3d extrusionH="190500" prstMaterial="dkEdge">
+          <a:bevelT w="135400" h="16350" prst="relaxedInset"/>
+          <a:contourClr>
+            <a:schemeClr val="bg1"/>
+          </a:contourClr>
+        </a:sp3d>
+      </dsp:spPr>
+      <dsp:style>
+        <a:lnRef idx="1">
+          <a:scrgbClr r="0" g="0" b="0"/>
+        </a:lnRef>
+        <a:fillRef idx="1">
+          <a:scrgbClr r="0" g="0" b="0"/>
+        </a:fillRef>
+        <a:effectRef idx="2">
+          <a:scrgbClr r="0" g="0" b="0"/>
+        </a:effectRef>
+        <a:fontRef idx="minor"/>
+      </dsp:style>
+      <dsp:txBody>
+        <a:bodyPr spcFirstLastPara="0" vert="horz" wrap="square" lIns="142240" tIns="12700" rIns="12700" bIns="12700" numCol="1" spcCol="1270" anchor="ctr" anchorCtr="0">
+          <a:noAutofit/>
+        </a:bodyPr>
+        <a:lstStyle/>
+        <a:p>
+          <a:pPr marL="228600" lvl="1" indent="-228600" algn="l" defTabSz="889000">
+            <a:lnSpc>
+              <a:spcPct val="90000"/>
+            </a:lnSpc>
+            <a:spcBef>
+              <a:spcPct val="0"/>
+            </a:spcBef>
+            <a:spcAft>
+              <a:spcPct val="15000"/>
+            </a:spcAft>
+            <a:buChar char="•"/>
+          </a:pPr>
+          <a:r>
+            <a:rPr lang="tr-TR" sz="2000" kern="1200" dirty="0" err="1"/>
+            <a:t>Cost</a:t>
+          </a:r>
+          <a:r>
+            <a:rPr lang="tr-TR" sz="2000" kern="1200" dirty="0"/>
+            <a:t> of </a:t>
+          </a:r>
+          <a:r>
+            <a:rPr lang="tr-TR" sz="2000" kern="1200" dirty="0" err="1"/>
+            <a:t>the</a:t>
+          </a:r>
+          <a:r>
+            <a:rPr lang="tr-TR" sz="2000" kern="1200" dirty="0"/>
+            <a:t> Design</a:t>
+          </a:r>
+          <a:endParaRPr lang="en-US" sz="2000" kern="1200" dirty="0"/>
+        </a:p>
+      </dsp:txBody>
+      <dsp:txXfrm rot="-5400000">
+        <a:off x="532011" y="3325700"/>
+        <a:ext cx="5539873" cy="445778"/>
       </dsp:txXfrm>
     </dsp:sp>
   </dsp:spTree>
@@ -8977,128 +9390,6 @@
       </p:grpSpPr>
       <p:sp>
         <p:nvSpPr>
-          <p:cNvPr id="2" name="Slayt Numarası Yer Tutucusu 1">
-            <a:extLst>
-              <a:ext uri="{FF2B5EF4-FFF2-40B4-BE49-F238E27FC236}">
-                <a16:creationId xmlns:a16="http://schemas.microsoft.com/office/drawing/2014/main" id="{E7C79544-B601-41A5-9B7D-81945987DA14}"/>
-              </a:ext>
-            </a:extLst>
-          </p:cNvPr>
-          <p:cNvSpPr>
-            <a:spLocks noGrp="1"/>
-          </p:cNvSpPr>
-          <p:nvPr>
-            <p:ph type="sldNum" sz="quarter" idx="12"/>
-          </p:nvPr>
-        </p:nvSpPr>
-        <p:spPr/>
-        <p:txBody>
-          <a:bodyPr/>
-          <a:lstStyle/>
-          <a:p>
-            <a:pPr>
-              <a:defRPr/>
-            </a:pPr>
-            <a:fld id="{2B6B82CF-D217-463E-A20B-B8F45CA8845C}" type="slidenum">
-              <a:rPr lang="en-US" smtClean="0"/>
-              <a:pPr>
-                <a:defRPr/>
-              </a:pPr>
-              <a:t>11</a:t>
-            </a:fld>
-            <a:endParaRPr lang="en-US"/>
-          </a:p>
-        </p:txBody>
-      </p:sp>
-      <p:sp>
-        <p:nvSpPr>
-          <p:cNvPr id="3" name="Başlık 2">
-            <a:extLst>
-              <a:ext uri="{FF2B5EF4-FFF2-40B4-BE49-F238E27FC236}">
-                <a16:creationId xmlns:a16="http://schemas.microsoft.com/office/drawing/2014/main" id="{74D7374C-2C02-4B5A-83B0-5D40E43AE2EA}"/>
-              </a:ext>
-            </a:extLst>
-          </p:cNvPr>
-          <p:cNvSpPr>
-            <a:spLocks noGrp="1"/>
-          </p:cNvSpPr>
-          <p:nvPr>
-            <p:ph type="title"/>
-          </p:nvPr>
-        </p:nvSpPr>
-        <p:spPr/>
-        <p:txBody>
-          <a:bodyPr/>
-          <a:lstStyle/>
-          <a:p>
-            <a:endParaRPr lang="en-US" dirty="0"/>
-          </a:p>
-        </p:txBody>
-      </p:sp>
-      <p:sp>
-        <p:nvSpPr>
-          <p:cNvPr id="4" name="Veri Yer Tutucusu 3">
-            <a:extLst>
-              <a:ext uri="{FF2B5EF4-FFF2-40B4-BE49-F238E27FC236}">
-                <a16:creationId xmlns:a16="http://schemas.microsoft.com/office/drawing/2014/main" id="{458AE49E-A4B7-4002-8A2D-493F049DC92D}"/>
-              </a:ext>
-            </a:extLst>
-          </p:cNvPr>
-          <p:cNvSpPr>
-            <a:spLocks noGrp="1"/>
-          </p:cNvSpPr>
-          <p:nvPr>
-            <p:ph type="dt" sz="half" idx="2"/>
-          </p:nvPr>
-        </p:nvSpPr>
-        <p:spPr/>
-        <p:txBody>
-          <a:bodyPr/>
-          <a:lstStyle/>
-          <a:p>
-            <a:pPr>
-              <a:defRPr/>
-            </a:pPr>
-            <a:r>
-              <a:rPr lang="tr-TR"/>
-              <a:t>METU Electrical &amp; Electronics Engineering Department</a:t>
-            </a:r>
-            <a:endParaRPr lang="en-US" dirty="0"/>
-          </a:p>
-        </p:txBody>
-      </p:sp>
-    </p:spTree>
-    <p:extLst>
-      <p:ext uri="{BB962C8B-B14F-4D97-AF65-F5344CB8AC3E}">
-        <p14:creationId xmlns:p14="http://schemas.microsoft.com/office/powerpoint/2010/main" val="1486710840"/>
-      </p:ext>
-    </p:extLst>
-  </p:cSld>
-  <p:clrMapOvr>
-    <a:masterClrMapping/>
-  </p:clrMapOvr>
-</p:sld>
-</file>
-
-<file path=ppt/slides/slide12.xml><?xml version="1.0" encoding="utf-8"?>
-<p:sld xmlns:a="http://schemas.openxmlformats.org/drawingml/2006/main" xmlns:r="http://schemas.openxmlformats.org/officeDocument/2006/relationships" xmlns:p="http://schemas.openxmlformats.org/presentationml/2006/main">
-  <p:cSld>
-    <p:spTree>
-      <p:nvGrpSpPr>
-        <p:cNvPr id="1" name=""/>
-        <p:cNvGrpSpPr/>
-        <p:nvPr/>
-      </p:nvGrpSpPr>
-      <p:grpSpPr>
-        <a:xfrm>
-          <a:off x="0" y="0"/>
-          <a:ext cx="0" cy="0"/>
-          <a:chOff x="0" y="0"/>
-          <a:chExt cx="0" cy="0"/>
-        </a:xfrm>
-      </p:grpSpPr>
-      <p:sp>
-        <p:nvSpPr>
           <p:cNvPr id="2" name="Title 1"/>
           <p:cNvSpPr>
             <a:spLocks noGrp="1"/>
@@ -9143,7 +9434,7 @@
               <a:pPr>
                 <a:defRPr/>
               </a:pPr>
-              <a:t>12</a:t>
+              <a:t>11</a:t>
             </a:fld>
             <a:endParaRPr lang="en-US" dirty="0"/>
           </a:p>
@@ -9213,7 +9504,7 @@
 </p:sld>
 </file>
 
-<file path=ppt/slides/slide13.xml><?xml version="1.0" encoding="utf-8"?>
+<file path=ppt/slides/slide12.xml><?xml version="1.0" encoding="utf-8"?>
 <p:sld xmlns:a="http://schemas.openxmlformats.org/drawingml/2006/main" xmlns:r="http://schemas.openxmlformats.org/officeDocument/2006/relationships" xmlns:p="http://schemas.openxmlformats.org/presentationml/2006/main">
   <p:cSld>
     <p:spTree>
@@ -9825,7 +10116,7 @@
               <a:pPr>
                 <a:defRPr/>
               </a:pPr>
-              <a:t>13</a:t>
+              <a:t>12</a:t>
             </a:fld>
             <a:endParaRPr lang="en-US" dirty="0"/>
           </a:p>
@@ -9876,7 +10167,7 @@
 </p:sld>
 </file>
 
-<file path=ppt/slides/slide14.xml><?xml version="1.0" encoding="utf-8"?>
+<file path=ppt/slides/slide13.xml><?xml version="1.0" encoding="utf-8"?>
 <p:sld xmlns:a="http://schemas.openxmlformats.org/drawingml/2006/main" xmlns:r="http://schemas.openxmlformats.org/officeDocument/2006/relationships" xmlns:p="http://schemas.openxmlformats.org/presentationml/2006/main">
   <p:cSld>
     <p:spTree>
@@ -10618,7 +10909,7 @@
               <a:pPr>
                 <a:defRPr/>
               </a:pPr>
-              <a:t>14</a:t>
+              <a:t>13</a:t>
             </a:fld>
             <a:endParaRPr lang="en-US" dirty="0"/>
           </a:p>
@@ -10669,7 +10960,7 @@
 </p:sld>
 </file>
 
-<file path=ppt/slides/slide15.xml><?xml version="1.0" encoding="utf-8"?>
+<file path=ppt/slides/slide14.xml><?xml version="1.0" encoding="utf-8"?>
 <p:sld xmlns:a="http://schemas.openxmlformats.org/drawingml/2006/main" xmlns:r="http://schemas.openxmlformats.org/officeDocument/2006/relationships" xmlns:p="http://schemas.openxmlformats.org/presentationml/2006/main">
   <p:cSld>
     <p:spTree>
@@ -10752,7 +11043,7 @@
               <a:pPr>
                 <a:defRPr/>
               </a:pPr>
-              <a:t>15</a:t>
+              <a:t>14</a:t>
             </a:fld>
             <a:endParaRPr lang="en-US" dirty="0"/>
           </a:p>
@@ -10863,7 +11154,7 @@
 </p:sld>
 </file>
 
-<file path=ppt/slides/slide16.xml><?xml version="1.0" encoding="utf-8"?>
+<file path=ppt/slides/slide15.xml><?xml version="1.0" encoding="utf-8"?>
 <p:sld xmlns:a="http://schemas.openxmlformats.org/drawingml/2006/main" xmlns:r="http://schemas.openxmlformats.org/officeDocument/2006/relationships" xmlns:p="http://schemas.openxmlformats.org/presentationml/2006/main">
   <p:cSld>
     <p:spTree>
@@ -10946,7 +11237,7 @@
               <a:pPr>
                 <a:defRPr/>
               </a:pPr>
-              <a:t>16</a:t>
+              <a:t>15</a:t>
             </a:fld>
             <a:endParaRPr lang="en-US" dirty="0"/>
           </a:p>
@@ -11056,7 +11347,7 @@
 </p:sld>
 </file>
 
-<file path=ppt/slides/slide17.xml><?xml version="1.0" encoding="utf-8"?>
+<file path=ppt/slides/slide16.xml><?xml version="1.0" encoding="utf-8"?>
 <p:sld xmlns:a="http://schemas.openxmlformats.org/drawingml/2006/main" xmlns:r="http://schemas.openxmlformats.org/officeDocument/2006/relationships" xmlns:p="http://schemas.openxmlformats.org/presentationml/2006/main">
   <p:cSld>
     <p:spTree>
@@ -11686,7 +11977,7 @@
               <a:pPr>
                 <a:defRPr/>
               </a:pPr>
-              <a:t>17</a:t>
+              <a:t>16</a:t>
             </a:fld>
             <a:endParaRPr lang="en-US" dirty="0"/>
           </a:p>
@@ -11737,7 +12028,7 @@
 </p:sld>
 </file>
 
-<file path=ppt/slides/slide18.xml><?xml version="1.0" encoding="utf-8"?>
+<file path=ppt/slides/slide17.xml><?xml version="1.0" encoding="utf-8"?>
 <p:sld xmlns:a="http://schemas.openxmlformats.org/drawingml/2006/main" xmlns:r="http://schemas.openxmlformats.org/officeDocument/2006/relationships" xmlns:p="http://schemas.openxmlformats.org/presentationml/2006/main">
   <p:cSld>
     <p:spTree>
@@ -11816,7 +12107,7 @@
               <a:pPr>
                 <a:defRPr/>
               </a:pPr>
-              <a:t>18</a:t>
+              <a:t>17</a:t>
             </a:fld>
             <a:endParaRPr lang="en-US" dirty="0"/>
           </a:p>
@@ -11926,7 +12217,7 @@
 </p:sld>
 </file>
 
-<file path=ppt/slides/slide19.xml><?xml version="1.0" encoding="utf-8"?>
+<file path=ppt/slides/slide18.xml><?xml version="1.0" encoding="utf-8"?>
 <p:sld xmlns:a="http://schemas.openxmlformats.org/drawingml/2006/main" xmlns:r="http://schemas.openxmlformats.org/officeDocument/2006/relationships" xmlns:p="http://schemas.openxmlformats.org/presentationml/2006/main">
   <p:cSld>
     <p:spTree>
@@ -12005,7 +12296,7 @@
               <a:pPr>
                 <a:defRPr/>
               </a:pPr>
-              <a:t>19</a:t>
+              <a:t>18</a:t>
             </a:fld>
             <a:endParaRPr lang="en-US" dirty="0"/>
           </a:p>
@@ -12115,259 +12406,7 @@
 </p:sld>
 </file>
 
-<file path=ppt/slides/slide2.xml><?xml version="1.0" encoding="utf-8"?>
-<p:sld xmlns:a="http://schemas.openxmlformats.org/drawingml/2006/main" xmlns:r="http://schemas.openxmlformats.org/officeDocument/2006/relationships" xmlns:p="http://schemas.openxmlformats.org/presentationml/2006/main">
-  <p:cSld>
-    <p:spTree>
-      <p:nvGrpSpPr>
-        <p:cNvPr id="1" name=""/>
-        <p:cNvGrpSpPr/>
-        <p:nvPr/>
-      </p:nvGrpSpPr>
-      <p:grpSpPr>
-        <a:xfrm>
-          <a:off x="0" y="0"/>
-          <a:ext cx="0" cy="0"/>
-          <a:chOff x="0" y="0"/>
-          <a:chExt cx="0" cy="0"/>
-        </a:xfrm>
-      </p:grpSpPr>
-      <p:sp>
-        <p:nvSpPr>
-          <p:cNvPr id="2" name="Metin kutusu 1">
-            <a:extLst>
-              <a:ext uri="{FF2B5EF4-FFF2-40B4-BE49-F238E27FC236}">
-                <a16:creationId xmlns:a16="http://schemas.microsoft.com/office/drawing/2014/main" id="{991E47C5-89D8-4146-A2E2-F3D62DA72C81}"/>
-              </a:ext>
-            </a:extLst>
-          </p:cNvPr>
-          <p:cNvSpPr txBox="1"/>
-          <p:nvPr/>
-        </p:nvSpPr>
-        <p:spPr>
-          <a:xfrm>
-            <a:off x="4572000" y="2271711"/>
-            <a:ext cx="4086225" cy="523220"/>
-          </a:xfrm>
-          <a:prstGeom prst="rect">
-            <a:avLst/>
-          </a:prstGeom>
-          <a:solidFill>
-            <a:srgbClr val="D0112B"/>
-          </a:solidFill>
-        </p:spPr>
-        <p:txBody>
-          <a:bodyPr wrap="square" rtlCol="0">
-            <a:spAutoFit/>
-          </a:bodyPr>
-          <a:lstStyle/>
-          <a:p>
-            <a:r>
-              <a:rPr lang="tr-TR" sz="2800" b="1" dirty="0">
-                <a:solidFill>
-                  <a:schemeClr val="bg1"/>
-                </a:solidFill>
-                <a:latin typeface="Century Gothic" panose="020B0502020202020204" pitchFamily="34" charset="0"/>
-              </a:rPr>
-              <a:t>EE464- TERM PROJECT</a:t>
-            </a:r>
-            <a:endParaRPr lang="en-US" sz="2800" b="1" dirty="0">
-              <a:solidFill>
-                <a:schemeClr val="bg1"/>
-              </a:solidFill>
-              <a:latin typeface="Century Gothic" panose="020B0502020202020204" pitchFamily="34" charset="0"/>
-            </a:endParaRPr>
-          </a:p>
-        </p:txBody>
-      </p:sp>
-      <p:sp>
-        <p:nvSpPr>
-          <p:cNvPr id="3" name="Metin kutusu 2">
-            <a:extLst>
-              <a:ext uri="{FF2B5EF4-FFF2-40B4-BE49-F238E27FC236}">
-                <a16:creationId xmlns:a16="http://schemas.microsoft.com/office/drawing/2014/main" id="{775DB982-AA4C-4E43-8156-21705AA6CD45}"/>
-              </a:ext>
-            </a:extLst>
-          </p:cNvPr>
-          <p:cNvSpPr txBox="1"/>
-          <p:nvPr/>
-        </p:nvSpPr>
-        <p:spPr>
-          <a:xfrm>
-            <a:off x="4724400" y="3563661"/>
-            <a:ext cx="4086225" cy="923330"/>
-          </a:xfrm>
-          <a:prstGeom prst="rect">
-            <a:avLst/>
-          </a:prstGeom>
-          <a:solidFill>
-            <a:srgbClr val="D0112B"/>
-          </a:solidFill>
-        </p:spPr>
-        <p:txBody>
-          <a:bodyPr wrap="square" rtlCol="0">
-            <a:spAutoFit/>
-          </a:bodyPr>
-          <a:lstStyle/>
-          <a:p>
-            <a:pPr rtl="0">
-              <a:lnSpc>
-                <a:spcPct val="100000"/>
-              </a:lnSpc>
-            </a:pPr>
-            <a:r>
-              <a:rPr lang="tr-TR" dirty="0">
-                <a:solidFill>
-                  <a:schemeClr val="bg1"/>
-                </a:solidFill>
-                <a:latin typeface="Century Gothic" panose="020B0502020202020204" pitchFamily="34" charset="0"/>
-              </a:rPr>
-              <a:t>Büşra Nur Koçak</a:t>
-            </a:r>
-          </a:p>
-          <a:p>
-            <a:pPr rtl="0">
-              <a:lnSpc>
-                <a:spcPct val="100000"/>
-              </a:lnSpc>
-            </a:pPr>
-            <a:r>
-              <a:rPr lang="tr-TR" dirty="0">
-                <a:solidFill>
-                  <a:schemeClr val="bg1"/>
-                </a:solidFill>
-                <a:latin typeface="Century Gothic" panose="020B0502020202020204" pitchFamily="34" charset="0"/>
-              </a:rPr>
-              <a:t>Defne Nur Korkmaz</a:t>
-            </a:r>
-          </a:p>
-          <a:p>
-            <a:pPr rtl="0">
-              <a:lnSpc>
-                <a:spcPct val="100000"/>
-              </a:lnSpc>
-            </a:pPr>
-            <a:r>
-              <a:rPr lang="tr-TR" dirty="0">
-                <a:solidFill>
-                  <a:schemeClr val="bg1"/>
-                </a:solidFill>
-                <a:latin typeface="Century Gothic" panose="020B0502020202020204" pitchFamily="34" charset="0"/>
-              </a:rPr>
-              <a:t>Mustafa Mert Sarıkaya</a:t>
-            </a:r>
-          </a:p>
-        </p:txBody>
-      </p:sp>
-      <p:sp>
-        <p:nvSpPr>
-          <p:cNvPr id="4" name="Metin kutusu 3">
-            <a:extLst>
-              <a:ext uri="{FF2B5EF4-FFF2-40B4-BE49-F238E27FC236}">
-                <a16:creationId xmlns:a16="http://schemas.microsoft.com/office/drawing/2014/main" id="{7724B07D-54A8-4AB3-897D-74BC9F619059}"/>
-              </a:ext>
-            </a:extLst>
-          </p:cNvPr>
-          <p:cNvSpPr txBox="1"/>
-          <p:nvPr/>
-        </p:nvSpPr>
-        <p:spPr>
-          <a:xfrm>
-            <a:off x="4795837" y="5299124"/>
-            <a:ext cx="4086225" cy="954107"/>
-          </a:xfrm>
-          <a:prstGeom prst="rect">
-            <a:avLst/>
-          </a:prstGeom>
-          <a:solidFill>
-            <a:srgbClr val="D0112B"/>
-          </a:solidFill>
-        </p:spPr>
-        <p:txBody>
-          <a:bodyPr wrap="square" rtlCol="0">
-            <a:spAutoFit/>
-          </a:bodyPr>
-          <a:lstStyle/>
-          <a:p>
-            <a:pPr rtl="0">
-              <a:lnSpc>
-                <a:spcPct val="100000"/>
-              </a:lnSpc>
-            </a:pPr>
-            <a:endParaRPr lang="tr-TR" sz="1400" dirty="0">
-              <a:solidFill>
-                <a:schemeClr val="bg1"/>
-              </a:solidFill>
-              <a:latin typeface="Century Gothic" panose="020B0502020202020204" pitchFamily="34" charset="0"/>
-            </a:endParaRPr>
-          </a:p>
-          <a:p>
-            <a:pPr rtl="0">
-              <a:lnSpc>
-                <a:spcPct val="100000"/>
-              </a:lnSpc>
-            </a:pPr>
-            <a:endParaRPr lang="tr-TR" sz="1400" dirty="0">
-              <a:solidFill>
-                <a:schemeClr val="bg1"/>
-              </a:solidFill>
-              <a:latin typeface="Century Gothic" panose="020B0502020202020204" pitchFamily="34" charset="0"/>
-            </a:endParaRPr>
-          </a:p>
-          <a:p>
-            <a:pPr rtl="0">
-              <a:lnSpc>
-                <a:spcPct val="100000"/>
-              </a:lnSpc>
-            </a:pPr>
-            <a:r>
-              <a:rPr lang="tr-TR" sz="1400" dirty="0" err="1">
-                <a:solidFill>
-                  <a:schemeClr val="bg1"/>
-                </a:solidFill>
-                <a:latin typeface="Century Gothic" panose="020B0502020202020204" pitchFamily="34" charset="0"/>
-              </a:rPr>
-              <a:t>July</a:t>
-            </a:r>
-            <a:r>
-              <a:rPr lang="tr-TR" sz="1400" dirty="0">
-                <a:solidFill>
-                  <a:schemeClr val="bg1"/>
-                </a:solidFill>
-                <a:latin typeface="Century Gothic" panose="020B0502020202020204" pitchFamily="34" charset="0"/>
-              </a:rPr>
-              <a:t> 13, 2021</a:t>
-            </a:r>
-          </a:p>
-          <a:p>
-            <a:pPr rtl="0">
-              <a:lnSpc>
-                <a:spcPct val="100000"/>
-              </a:lnSpc>
-            </a:pPr>
-            <a:endParaRPr lang="tr-TR" sz="1400" dirty="0">
-              <a:solidFill>
-                <a:schemeClr val="bg1"/>
-              </a:solidFill>
-              <a:latin typeface="Century Gothic" panose="020B0502020202020204" pitchFamily="34" charset="0"/>
-            </a:endParaRPr>
-          </a:p>
-        </p:txBody>
-      </p:sp>
-    </p:spTree>
-    <p:extLst>
-      <p:ext uri="{BB962C8B-B14F-4D97-AF65-F5344CB8AC3E}">
-        <p14:creationId xmlns:p14="http://schemas.microsoft.com/office/powerpoint/2010/main" val="2752254962"/>
-      </p:ext>
-    </p:extLst>
-  </p:cSld>
-  <p:clrMapOvr>
-    <a:masterClrMapping/>
-  </p:clrMapOvr>
-</p:sld>
-</file>
-
-<file path=ppt/slides/slide20.xml><?xml version="1.0" encoding="utf-8"?>
+<file path=ppt/slides/slide19.xml><?xml version="1.0" encoding="utf-8"?>
 <p:sld xmlns:a="http://schemas.openxmlformats.org/drawingml/2006/main" xmlns:r="http://schemas.openxmlformats.org/officeDocument/2006/relationships" xmlns:p="http://schemas.openxmlformats.org/presentationml/2006/main">
   <p:cSld>
     <p:spTree>
@@ -12984,7 +13023,7 @@
               <a:pPr>
                 <a:defRPr/>
               </a:pPr>
-              <a:t>20</a:t>
+              <a:t>19</a:t>
             </a:fld>
             <a:endParaRPr lang="en-US" dirty="0"/>
           </a:p>
@@ -13035,7 +13074,259 @@
 </p:sld>
 </file>
 
-<file path=ppt/slides/slide21.xml><?xml version="1.0" encoding="utf-8"?>
+<file path=ppt/slides/slide2.xml><?xml version="1.0" encoding="utf-8"?>
+<p:sld xmlns:a="http://schemas.openxmlformats.org/drawingml/2006/main" xmlns:r="http://schemas.openxmlformats.org/officeDocument/2006/relationships" xmlns:p="http://schemas.openxmlformats.org/presentationml/2006/main">
+  <p:cSld>
+    <p:spTree>
+      <p:nvGrpSpPr>
+        <p:cNvPr id="1" name=""/>
+        <p:cNvGrpSpPr/>
+        <p:nvPr/>
+      </p:nvGrpSpPr>
+      <p:grpSpPr>
+        <a:xfrm>
+          <a:off x="0" y="0"/>
+          <a:ext cx="0" cy="0"/>
+          <a:chOff x="0" y="0"/>
+          <a:chExt cx="0" cy="0"/>
+        </a:xfrm>
+      </p:grpSpPr>
+      <p:sp>
+        <p:nvSpPr>
+          <p:cNvPr id="2" name="Metin kutusu 1">
+            <a:extLst>
+              <a:ext uri="{FF2B5EF4-FFF2-40B4-BE49-F238E27FC236}">
+                <a16:creationId xmlns:a16="http://schemas.microsoft.com/office/drawing/2014/main" id="{991E47C5-89D8-4146-A2E2-F3D62DA72C81}"/>
+              </a:ext>
+            </a:extLst>
+          </p:cNvPr>
+          <p:cNvSpPr txBox="1"/>
+          <p:nvPr/>
+        </p:nvSpPr>
+        <p:spPr>
+          <a:xfrm>
+            <a:off x="4572000" y="2271711"/>
+            <a:ext cx="4086225" cy="523220"/>
+          </a:xfrm>
+          <a:prstGeom prst="rect">
+            <a:avLst/>
+          </a:prstGeom>
+          <a:solidFill>
+            <a:srgbClr val="D0112B"/>
+          </a:solidFill>
+        </p:spPr>
+        <p:txBody>
+          <a:bodyPr wrap="square" rtlCol="0">
+            <a:spAutoFit/>
+          </a:bodyPr>
+          <a:lstStyle/>
+          <a:p>
+            <a:r>
+              <a:rPr lang="tr-TR" sz="2800" b="1" dirty="0">
+                <a:solidFill>
+                  <a:schemeClr val="bg1"/>
+                </a:solidFill>
+                <a:latin typeface="Century Gothic" panose="020B0502020202020204" pitchFamily="34" charset="0"/>
+              </a:rPr>
+              <a:t>EE464- TERM PROJECT</a:t>
+            </a:r>
+            <a:endParaRPr lang="en-US" sz="2800" b="1" dirty="0">
+              <a:solidFill>
+                <a:schemeClr val="bg1"/>
+              </a:solidFill>
+              <a:latin typeface="Century Gothic" panose="020B0502020202020204" pitchFamily="34" charset="0"/>
+            </a:endParaRPr>
+          </a:p>
+        </p:txBody>
+      </p:sp>
+      <p:sp>
+        <p:nvSpPr>
+          <p:cNvPr id="3" name="Metin kutusu 2">
+            <a:extLst>
+              <a:ext uri="{FF2B5EF4-FFF2-40B4-BE49-F238E27FC236}">
+                <a16:creationId xmlns:a16="http://schemas.microsoft.com/office/drawing/2014/main" id="{775DB982-AA4C-4E43-8156-21705AA6CD45}"/>
+              </a:ext>
+            </a:extLst>
+          </p:cNvPr>
+          <p:cNvSpPr txBox="1"/>
+          <p:nvPr/>
+        </p:nvSpPr>
+        <p:spPr>
+          <a:xfrm>
+            <a:off x="4724400" y="3563661"/>
+            <a:ext cx="4086225" cy="923330"/>
+          </a:xfrm>
+          <a:prstGeom prst="rect">
+            <a:avLst/>
+          </a:prstGeom>
+          <a:solidFill>
+            <a:srgbClr val="D0112B"/>
+          </a:solidFill>
+        </p:spPr>
+        <p:txBody>
+          <a:bodyPr wrap="square" rtlCol="0">
+            <a:spAutoFit/>
+          </a:bodyPr>
+          <a:lstStyle/>
+          <a:p>
+            <a:pPr rtl="0">
+              <a:lnSpc>
+                <a:spcPct val="100000"/>
+              </a:lnSpc>
+            </a:pPr>
+            <a:r>
+              <a:rPr lang="tr-TR" dirty="0">
+                <a:solidFill>
+                  <a:schemeClr val="bg1"/>
+                </a:solidFill>
+                <a:latin typeface="Century Gothic" panose="020B0502020202020204" pitchFamily="34" charset="0"/>
+              </a:rPr>
+              <a:t>Büşra Nur Koçak</a:t>
+            </a:r>
+          </a:p>
+          <a:p>
+            <a:pPr rtl="0">
+              <a:lnSpc>
+                <a:spcPct val="100000"/>
+              </a:lnSpc>
+            </a:pPr>
+            <a:r>
+              <a:rPr lang="tr-TR" dirty="0">
+                <a:solidFill>
+                  <a:schemeClr val="bg1"/>
+                </a:solidFill>
+                <a:latin typeface="Century Gothic" panose="020B0502020202020204" pitchFamily="34" charset="0"/>
+              </a:rPr>
+              <a:t>Defne Nur Korkmaz</a:t>
+            </a:r>
+          </a:p>
+          <a:p>
+            <a:pPr rtl="0">
+              <a:lnSpc>
+                <a:spcPct val="100000"/>
+              </a:lnSpc>
+            </a:pPr>
+            <a:r>
+              <a:rPr lang="tr-TR" dirty="0">
+                <a:solidFill>
+                  <a:schemeClr val="bg1"/>
+                </a:solidFill>
+                <a:latin typeface="Century Gothic" panose="020B0502020202020204" pitchFamily="34" charset="0"/>
+              </a:rPr>
+              <a:t>Mustafa Mert Sarıkaya</a:t>
+            </a:r>
+          </a:p>
+        </p:txBody>
+      </p:sp>
+      <p:sp>
+        <p:nvSpPr>
+          <p:cNvPr id="4" name="Metin kutusu 3">
+            <a:extLst>
+              <a:ext uri="{FF2B5EF4-FFF2-40B4-BE49-F238E27FC236}">
+                <a16:creationId xmlns:a16="http://schemas.microsoft.com/office/drawing/2014/main" id="{7724B07D-54A8-4AB3-897D-74BC9F619059}"/>
+              </a:ext>
+            </a:extLst>
+          </p:cNvPr>
+          <p:cNvSpPr txBox="1"/>
+          <p:nvPr/>
+        </p:nvSpPr>
+        <p:spPr>
+          <a:xfrm>
+            <a:off x="4795837" y="5299124"/>
+            <a:ext cx="4086225" cy="954107"/>
+          </a:xfrm>
+          <a:prstGeom prst="rect">
+            <a:avLst/>
+          </a:prstGeom>
+          <a:solidFill>
+            <a:srgbClr val="D0112B"/>
+          </a:solidFill>
+        </p:spPr>
+        <p:txBody>
+          <a:bodyPr wrap="square" rtlCol="0">
+            <a:spAutoFit/>
+          </a:bodyPr>
+          <a:lstStyle/>
+          <a:p>
+            <a:pPr rtl="0">
+              <a:lnSpc>
+                <a:spcPct val="100000"/>
+              </a:lnSpc>
+            </a:pPr>
+            <a:endParaRPr lang="tr-TR" sz="1400" dirty="0">
+              <a:solidFill>
+                <a:schemeClr val="bg1"/>
+              </a:solidFill>
+              <a:latin typeface="Century Gothic" panose="020B0502020202020204" pitchFamily="34" charset="0"/>
+            </a:endParaRPr>
+          </a:p>
+          <a:p>
+            <a:pPr rtl="0">
+              <a:lnSpc>
+                <a:spcPct val="100000"/>
+              </a:lnSpc>
+            </a:pPr>
+            <a:endParaRPr lang="tr-TR" sz="1400" dirty="0">
+              <a:solidFill>
+                <a:schemeClr val="bg1"/>
+              </a:solidFill>
+              <a:latin typeface="Century Gothic" panose="020B0502020202020204" pitchFamily="34" charset="0"/>
+            </a:endParaRPr>
+          </a:p>
+          <a:p>
+            <a:pPr rtl="0">
+              <a:lnSpc>
+                <a:spcPct val="100000"/>
+              </a:lnSpc>
+            </a:pPr>
+            <a:r>
+              <a:rPr lang="tr-TR" sz="1400" dirty="0" err="1">
+                <a:solidFill>
+                  <a:schemeClr val="bg1"/>
+                </a:solidFill>
+                <a:latin typeface="Century Gothic" panose="020B0502020202020204" pitchFamily="34" charset="0"/>
+              </a:rPr>
+              <a:t>July</a:t>
+            </a:r>
+            <a:r>
+              <a:rPr lang="tr-TR" sz="1400" dirty="0">
+                <a:solidFill>
+                  <a:schemeClr val="bg1"/>
+                </a:solidFill>
+                <a:latin typeface="Century Gothic" panose="020B0502020202020204" pitchFamily="34" charset="0"/>
+              </a:rPr>
+              <a:t> 13, 2021</a:t>
+            </a:r>
+          </a:p>
+          <a:p>
+            <a:pPr rtl="0">
+              <a:lnSpc>
+                <a:spcPct val="100000"/>
+              </a:lnSpc>
+            </a:pPr>
+            <a:endParaRPr lang="tr-TR" sz="1400" dirty="0">
+              <a:solidFill>
+                <a:schemeClr val="bg1"/>
+              </a:solidFill>
+              <a:latin typeface="Century Gothic" panose="020B0502020202020204" pitchFamily="34" charset="0"/>
+            </a:endParaRPr>
+          </a:p>
+        </p:txBody>
+      </p:sp>
+    </p:spTree>
+    <p:extLst>
+      <p:ext uri="{BB962C8B-B14F-4D97-AF65-F5344CB8AC3E}">
+        <p14:creationId xmlns:p14="http://schemas.microsoft.com/office/powerpoint/2010/main" val="2752254962"/>
+      </p:ext>
+    </p:extLst>
+  </p:cSld>
+  <p:clrMapOvr>
+    <a:masterClrMapping/>
+  </p:clrMapOvr>
+</p:sld>
+</file>
+
+<file path=ppt/slides/slide20.xml><?xml version="1.0" encoding="utf-8"?>
 <p:sld xmlns:a="http://schemas.openxmlformats.org/drawingml/2006/main" xmlns:r="http://schemas.openxmlformats.org/officeDocument/2006/relationships" xmlns:p="http://schemas.openxmlformats.org/presentationml/2006/main">
   <p:cSld>
     <p:spTree>
@@ -13114,7 +13405,7 @@
               <a:pPr>
                 <a:defRPr/>
               </a:pPr>
-              <a:t>21</a:t>
+              <a:t>20</a:t>
             </a:fld>
             <a:endParaRPr lang="en-US" dirty="0"/>
           </a:p>
@@ -13224,7 +13515,7 @@
 </p:sld>
 </file>
 
-<file path=ppt/slides/slide22.xml><?xml version="1.0" encoding="utf-8"?>
+<file path=ppt/slides/slide21.xml><?xml version="1.0" encoding="utf-8"?>
 <p:sld xmlns:a="http://schemas.openxmlformats.org/drawingml/2006/main" xmlns:r="http://schemas.openxmlformats.org/officeDocument/2006/relationships" xmlns:p="http://schemas.openxmlformats.org/presentationml/2006/main">
   <p:cSld>
     <p:spTree>
@@ -13303,7 +13594,7 @@
               <a:pPr>
                 <a:defRPr/>
               </a:pPr>
-              <a:t>22</a:t>
+              <a:t>21</a:t>
             </a:fld>
             <a:endParaRPr lang="en-US" dirty="0"/>
           </a:p>
@@ -13413,7 +13704,7 @@
 </p:sld>
 </file>
 
-<file path=ppt/slides/slide23.xml><?xml version="1.0" encoding="utf-8"?>
+<file path=ppt/slides/slide22.xml><?xml version="1.0" encoding="utf-8"?>
 <p:sld xmlns:a="http://schemas.openxmlformats.org/drawingml/2006/main" xmlns:r="http://schemas.openxmlformats.org/officeDocument/2006/relationships" xmlns:p="http://schemas.openxmlformats.org/presentationml/2006/main">
   <p:cSld>
     <p:spTree>
@@ -13494,7 +13785,7 @@
               <a:pPr>
                 <a:defRPr/>
               </a:pPr>
-              <a:t>23</a:t>
+              <a:t>22</a:t>
             </a:fld>
             <a:endParaRPr lang="en-US" dirty="0"/>
           </a:p>
@@ -14655,7 +14946,7 @@
 </p:sld>
 </file>
 
-<file path=ppt/slides/slide24.xml><?xml version="1.0" encoding="utf-8"?>
+<file path=ppt/slides/slide23.xml><?xml version="1.0" encoding="utf-8"?>
 <p:sld xmlns:a="http://schemas.openxmlformats.org/drawingml/2006/main" xmlns:r="http://schemas.openxmlformats.org/officeDocument/2006/relationships" xmlns:p="http://schemas.openxmlformats.org/presentationml/2006/main">
   <p:cSld>
     <p:spTree>
@@ -14694,6 +14985,772 @@
           <a:lstStyle/>
           <a:p>
             <a:r>
+              <a:rPr lang="en-US" dirty="0"/>
+              <a:t>Thermal Results</a:t>
+            </a:r>
+          </a:p>
+        </p:txBody>
+      </p:sp>
+      <p:graphicFrame>
+        <p:nvGraphicFramePr>
+          <p:cNvPr id="8" name="İçerik Yer Tutucusu 7">
+            <a:extLst>
+              <a:ext uri="{FF2B5EF4-FFF2-40B4-BE49-F238E27FC236}">
+                <a16:creationId xmlns:a16="http://schemas.microsoft.com/office/drawing/2014/main" id="{5B7D66AD-2EB6-4FF7-96B0-75C893F196E5}"/>
+              </a:ext>
+            </a:extLst>
+          </p:cNvPr>
+          <p:cNvGraphicFramePr>
+            <a:graphicFrameLocks noGrp="1"/>
+          </p:cNvGraphicFramePr>
+          <p:nvPr>
+            <p:ph idx="1"/>
+          </p:nvPr>
+        </p:nvGraphicFramePr>
+        <p:xfrm>
+          <a:off x="685800" y="2285999"/>
+          <a:ext cx="6667500" cy="1769750"/>
+        </p:xfrm>
+        <a:graphic>
+          <a:graphicData uri="http://schemas.openxmlformats.org/drawingml/2006/table">
+            <a:tbl>
+              <a:tblPr firstRow="1" firstCol="1" bandRow="1">
+                <a:tableStyleId>{5C22544A-7EE6-4342-B048-85BDC9FD1C3A}</a:tableStyleId>
+              </a:tblPr>
+              <a:tblGrid>
+                <a:gridCol w="3333750">
+                  <a:extLst>
+                    <a:ext uri="{9D8B030D-6E8A-4147-A177-3AD203B41FA5}">
+                      <a16:colId xmlns:a16="http://schemas.microsoft.com/office/drawing/2014/main" val="3483855649"/>
+                    </a:ext>
+                  </a:extLst>
+                </a:gridCol>
+                <a:gridCol w="3333750">
+                  <a:extLst>
+                    <a:ext uri="{9D8B030D-6E8A-4147-A177-3AD203B41FA5}">
+                      <a16:colId xmlns:a16="http://schemas.microsoft.com/office/drawing/2014/main" val="4008998777"/>
+                    </a:ext>
+                  </a:extLst>
+                </a:gridCol>
+              </a:tblGrid>
+              <a:tr h="353950">
+                <a:tc>
+                  <a:txBody>
+                    <a:bodyPr/>
+                    <a:lstStyle/>
+                    <a:p>
+                      <a:pPr marL="0" marR="0" algn="just">
+                        <a:lnSpc>
+                          <a:spcPct val="107000"/>
+                        </a:lnSpc>
+                        <a:spcBef>
+                          <a:spcPts val="0"/>
+                        </a:spcBef>
+                        <a:spcAft>
+                          <a:spcPts val="0"/>
+                        </a:spcAft>
+                      </a:pPr>
+                      <a:r>
+                        <a:rPr lang="en-US" sz="1200">
+                          <a:effectLst/>
+                        </a:rPr>
+                        <a:t>Component</a:t>
+                      </a:r>
+                      <a:endParaRPr lang="en-US" sz="1200">
+                        <a:effectLst/>
+                        <a:latin typeface="Times New Roman" panose="02020603050405020304" pitchFamily="18" charset="0"/>
+                        <a:ea typeface="Calibri" panose="020F0502020204030204" pitchFamily="34" charset="0"/>
+                        <a:cs typeface="Times New Roman" panose="02020603050405020304" pitchFamily="18" charset="0"/>
+                      </a:endParaRPr>
+                    </a:p>
+                  </a:txBody>
+                  <a:tcPr marL="68580" marR="68580" marT="0" marB="0"/>
+                </a:tc>
+                <a:tc>
+                  <a:txBody>
+                    <a:bodyPr/>
+                    <a:lstStyle/>
+                    <a:p>
+                      <a:pPr marL="0" marR="0" algn="just">
+                        <a:lnSpc>
+                          <a:spcPts val="1125"/>
+                        </a:lnSpc>
+                        <a:spcBef>
+                          <a:spcPts val="0"/>
+                        </a:spcBef>
+                        <a:spcAft>
+                          <a:spcPts val="0"/>
+                        </a:spcAft>
+                      </a:pPr>
+                      <a:r>
+                        <a:rPr lang="en-US" sz="1050">
+                          <a:effectLst/>
+                        </a:rPr>
+                        <a:t>Temperature</a:t>
+                      </a:r>
+                      <a:endParaRPr lang="en-US" sz="1200">
+                        <a:effectLst/>
+                        <a:latin typeface="Times New Roman" panose="02020603050405020304" pitchFamily="18" charset="0"/>
+                        <a:ea typeface="Calibri" panose="020F0502020204030204" pitchFamily="34" charset="0"/>
+                        <a:cs typeface="Times New Roman" panose="02020603050405020304" pitchFamily="18" charset="0"/>
+                      </a:endParaRPr>
+                    </a:p>
+                  </a:txBody>
+                  <a:tcPr marL="68580" marR="68580" marT="0" marB="0"/>
+                </a:tc>
+                <a:extLst>
+                  <a:ext uri="{0D108BD9-81ED-4DB2-BD59-A6C34878D82A}">
+                    <a16:rowId xmlns:a16="http://schemas.microsoft.com/office/drawing/2014/main" val="267038427"/>
+                  </a:ext>
+                </a:extLst>
+              </a:tr>
+              <a:tr h="353950">
+                <a:tc>
+                  <a:txBody>
+                    <a:bodyPr/>
+                    <a:lstStyle/>
+                    <a:p>
+                      <a:pPr marL="0" marR="0" algn="just">
+                        <a:lnSpc>
+                          <a:spcPct val="107000"/>
+                        </a:lnSpc>
+                        <a:spcBef>
+                          <a:spcPts val="0"/>
+                        </a:spcBef>
+                        <a:spcAft>
+                          <a:spcPts val="0"/>
+                        </a:spcAft>
+                      </a:pPr>
+                      <a:r>
+                        <a:rPr lang="en-US" sz="1200">
+                          <a:effectLst/>
+                        </a:rPr>
+                        <a:t>Mosfet</a:t>
+                      </a:r>
+                      <a:endParaRPr lang="en-US" sz="1200">
+                        <a:effectLst/>
+                        <a:latin typeface="Times New Roman" panose="02020603050405020304" pitchFamily="18" charset="0"/>
+                        <a:ea typeface="Calibri" panose="020F0502020204030204" pitchFamily="34" charset="0"/>
+                        <a:cs typeface="Times New Roman" panose="02020603050405020304" pitchFamily="18" charset="0"/>
+                      </a:endParaRPr>
+                    </a:p>
+                  </a:txBody>
+                  <a:tcPr marL="68580" marR="68580" marT="0" marB="0"/>
+                </a:tc>
+                <a:tc>
+                  <a:txBody>
+                    <a:bodyPr/>
+                    <a:lstStyle/>
+                    <a:p>
+                      <a:pPr marL="0" marR="0" algn="just">
+                        <a:lnSpc>
+                          <a:spcPct val="107000"/>
+                        </a:lnSpc>
+                        <a:spcBef>
+                          <a:spcPts val="0"/>
+                        </a:spcBef>
+                        <a:spcAft>
+                          <a:spcPts val="0"/>
+                        </a:spcAft>
+                      </a:pPr>
+                      <a:r>
+                        <a:rPr lang="tr-TR" sz="1200">
+                          <a:effectLst/>
+                        </a:rPr>
+                        <a:t>92.5 </a:t>
+                      </a:r>
+                      <a:r>
+                        <a:rPr lang="tr-TR" sz="1200" baseline="30000">
+                          <a:effectLst/>
+                        </a:rPr>
+                        <a:t>o</a:t>
+                      </a:r>
+                      <a:r>
+                        <a:rPr lang="tr-TR" sz="1200">
+                          <a:effectLst/>
+                        </a:rPr>
+                        <a:t>C</a:t>
+                      </a:r>
+                      <a:endParaRPr lang="en-US" sz="1200">
+                        <a:effectLst/>
+                        <a:latin typeface="Times New Roman" panose="02020603050405020304" pitchFamily="18" charset="0"/>
+                        <a:ea typeface="Calibri" panose="020F0502020204030204" pitchFamily="34" charset="0"/>
+                        <a:cs typeface="Times New Roman" panose="02020603050405020304" pitchFamily="18" charset="0"/>
+                      </a:endParaRPr>
+                    </a:p>
+                  </a:txBody>
+                  <a:tcPr marL="68580" marR="68580" marT="0" marB="0"/>
+                </a:tc>
+                <a:extLst>
+                  <a:ext uri="{0D108BD9-81ED-4DB2-BD59-A6C34878D82A}">
+                    <a16:rowId xmlns:a16="http://schemas.microsoft.com/office/drawing/2014/main" val="2734745818"/>
+                  </a:ext>
+                </a:extLst>
+              </a:tr>
+              <a:tr h="353950">
+                <a:tc>
+                  <a:txBody>
+                    <a:bodyPr/>
+                    <a:lstStyle/>
+                    <a:p>
+                      <a:pPr marL="0" marR="0" algn="just">
+                        <a:lnSpc>
+                          <a:spcPct val="107000"/>
+                        </a:lnSpc>
+                        <a:spcBef>
+                          <a:spcPts val="0"/>
+                        </a:spcBef>
+                        <a:spcAft>
+                          <a:spcPts val="0"/>
+                        </a:spcAft>
+                      </a:pPr>
+                      <a:r>
+                        <a:rPr lang="en-US" sz="1200">
+                          <a:effectLst/>
+                        </a:rPr>
+                        <a:t>Diode (without Heatsink)</a:t>
+                      </a:r>
+                      <a:endParaRPr lang="en-US" sz="1200">
+                        <a:effectLst/>
+                        <a:latin typeface="Times New Roman" panose="02020603050405020304" pitchFamily="18" charset="0"/>
+                        <a:ea typeface="Calibri" panose="020F0502020204030204" pitchFamily="34" charset="0"/>
+                        <a:cs typeface="Times New Roman" panose="02020603050405020304" pitchFamily="18" charset="0"/>
+                      </a:endParaRPr>
+                    </a:p>
+                  </a:txBody>
+                  <a:tcPr marL="68580" marR="68580" marT="0" marB="0"/>
+                </a:tc>
+                <a:tc>
+                  <a:txBody>
+                    <a:bodyPr/>
+                    <a:lstStyle/>
+                    <a:p>
+                      <a:pPr marL="0" marR="0" algn="just">
+                        <a:lnSpc>
+                          <a:spcPct val="107000"/>
+                        </a:lnSpc>
+                        <a:spcBef>
+                          <a:spcPts val="0"/>
+                        </a:spcBef>
+                        <a:spcAft>
+                          <a:spcPts val="0"/>
+                        </a:spcAft>
+                      </a:pPr>
+                      <a:r>
+                        <a:rPr lang="tr-TR" sz="1200">
+                          <a:effectLst/>
+                        </a:rPr>
+                        <a:t>338.5 </a:t>
+                      </a:r>
+                      <a:r>
+                        <a:rPr lang="tr-TR" sz="1200" baseline="30000">
+                          <a:effectLst/>
+                        </a:rPr>
+                        <a:t>o</a:t>
+                      </a:r>
+                      <a:r>
+                        <a:rPr lang="tr-TR" sz="1200">
+                          <a:effectLst/>
+                        </a:rPr>
+                        <a:t>C</a:t>
+                      </a:r>
+                      <a:endParaRPr lang="en-US" sz="1200">
+                        <a:effectLst/>
+                        <a:latin typeface="Times New Roman" panose="02020603050405020304" pitchFamily="18" charset="0"/>
+                        <a:ea typeface="Calibri" panose="020F0502020204030204" pitchFamily="34" charset="0"/>
+                        <a:cs typeface="Times New Roman" panose="02020603050405020304" pitchFamily="18" charset="0"/>
+                      </a:endParaRPr>
+                    </a:p>
+                  </a:txBody>
+                  <a:tcPr marL="68580" marR="68580" marT="0" marB="0"/>
+                </a:tc>
+                <a:extLst>
+                  <a:ext uri="{0D108BD9-81ED-4DB2-BD59-A6C34878D82A}">
+                    <a16:rowId xmlns:a16="http://schemas.microsoft.com/office/drawing/2014/main" val="3735130501"/>
+                  </a:ext>
+                </a:extLst>
+              </a:tr>
+              <a:tr h="353950">
+                <a:tc>
+                  <a:txBody>
+                    <a:bodyPr/>
+                    <a:lstStyle/>
+                    <a:p>
+                      <a:pPr marL="0" marR="0" algn="just">
+                        <a:lnSpc>
+                          <a:spcPct val="107000"/>
+                        </a:lnSpc>
+                        <a:spcBef>
+                          <a:spcPts val="0"/>
+                        </a:spcBef>
+                        <a:spcAft>
+                          <a:spcPts val="0"/>
+                        </a:spcAft>
+                      </a:pPr>
+                      <a:r>
+                        <a:rPr lang="en-US" sz="1200">
+                          <a:effectLst/>
+                        </a:rPr>
+                        <a:t>Diode (with Heatsink)</a:t>
+                      </a:r>
+                      <a:endParaRPr lang="en-US" sz="1200">
+                        <a:effectLst/>
+                        <a:latin typeface="Times New Roman" panose="02020603050405020304" pitchFamily="18" charset="0"/>
+                        <a:ea typeface="Calibri" panose="020F0502020204030204" pitchFamily="34" charset="0"/>
+                        <a:cs typeface="Times New Roman" panose="02020603050405020304" pitchFamily="18" charset="0"/>
+                      </a:endParaRPr>
+                    </a:p>
+                  </a:txBody>
+                  <a:tcPr marL="68580" marR="68580" marT="0" marB="0"/>
+                </a:tc>
+                <a:tc>
+                  <a:txBody>
+                    <a:bodyPr/>
+                    <a:lstStyle/>
+                    <a:p>
+                      <a:pPr marL="0" marR="0" algn="just">
+                        <a:lnSpc>
+                          <a:spcPct val="107000"/>
+                        </a:lnSpc>
+                        <a:spcBef>
+                          <a:spcPts val="0"/>
+                        </a:spcBef>
+                        <a:spcAft>
+                          <a:spcPts val="0"/>
+                        </a:spcAft>
+                      </a:pPr>
+                      <a:r>
+                        <a:rPr lang="tr-TR" sz="1200">
+                          <a:effectLst/>
+                        </a:rPr>
+                        <a:t>121.1 </a:t>
+                      </a:r>
+                      <a:r>
+                        <a:rPr lang="tr-TR" sz="1200" baseline="30000">
+                          <a:effectLst/>
+                        </a:rPr>
+                        <a:t>o</a:t>
+                      </a:r>
+                      <a:r>
+                        <a:rPr lang="tr-TR" sz="1200">
+                          <a:effectLst/>
+                        </a:rPr>
+                        <a:t>C</a:t>
+                      </a:r>
+                      <a:endParaRPr lang="en-US" sz="1200">
+                        <a:effectLst/>
+                        <a:latin typeface="Times New Roman" panose="02020603050405020304" pitchFamily="18" charset="0"/>
+                        <a:ea typeface="Calibri" panose="020F0502020204030204" pitchFamily="34" charset="0"/>
+                        <a:cs typeface="Times New Roman" panose="02020603050405020304" pitchFamily="18" charset="0"/>
+                      </a:endParaRPr>
+                    </a:p>
+                  </a:txBody>
+                  <a:tcPr marL="68580" marR="68580" marT="0" marB="0"/>
+                </a:tc>
+                <a:extLst>
+                  <a:ext uri="{0D108BD9-81ED-4DB2-BD59-A6C34878D82A}">
+                    <a16:rowId xmlns:a16="http://schemas.microsoft.com/office/drawing/2014/main" val="316087082"/>
+                  </a:ext>
+                </a:extLst>
+              </a:tr>
+              <a:tr h="353950">
+                <a:tc>
+                  <a:txBody>
+                    <a:bodyPr/>
+                    <a:lstStyle/>
+                    <a:p>
+                      <a:pPr marL="0" marR="0" algn="just">
+                        <a:lnSpc>
+                          <a:spcPct val="107000"/>
+                        </a:lnSpc>
+                        <a:spcBef>
+                          <a:spcPts val="0"/>
+                        </a:spcBef>
+                        <a:spcAft>
+                          <a:spcPts val="0"/>
+                        </a:spcAft>
+                      </a:pPr>
+                      <a:r>
+                        <a:rPr lang="en-US" sz="1200">
+                          <a:effectLst/>
+                        </a:rPr>
+                        <a:t>Transformer </a:t>
+                      </a:r>
+                      <a:endParaRPr lang="en-US" sz="1200">
+                        <a:effectLst/>
+                        <a:latin typeface="Times New Roman" panose="02020603050405020304" pitchFamily="18" charset="0"/>
+                        <a:ea typeface="Calibri" panose="020F0502020204030204" pitchFamily="34" charset="0"/>
+                        <a:cs typeface="Times New Roman" panose="02020603050405020304" pitchFamily="18" charset="0"/>
+                      </a:endParaRPr>
+                    </a:p>
+                  </a:txBody>
+                  <a:tcPr marL="68580" marR="68580" marT="0" marB="0"/>
+                </a:tc>
+                <a:tc>
+                  <a:txBody>
+                    <a:bodyPr/>
+                    <a:lstStyle/>
+                    <a:p>
+                      <a:pPr marL="0" marR="0" algn="just">
+                        <a:lnSpc>
+                          <a:spcPct val="107000"/>
+                        </a:lnSpc>
+                        <a:spcBef>
+                          <a:spcPts val="0"/>
+                        </a:spcBef>
+                        <a:spcAft>
+                          <a:spcPts val="0"/>
+                        </a:spcAft>
+                      </a:pPr>
+                      <a:r>
+                        <a:rPr lang="tr-TR" sz="1200" dirty="0">
+                          <a:effectLst/>
+                        </a:rPr>
+                        <a:t>234 </a:t>
+                      </a:r>
+                      <a:r>
+                        <a:rPr lang="tr-TR" sz="1200" baseline="30000" dirty="0" err="1">
+                          <a:effectLst/>
+                        </a:rPr>
+                        <a:t>o</a:t>
+                      </a:r>
+                      <a:r>
+                        <a:rPr lang="tr-TR" sz="1200" dirty="0" err="1">
+                          <a:effectLst/>
+                        </a:rPr>
+                        <a:t>C</a:t>
+                      </a:r>
+                      <a:endParaRPr lang="en-US" sz="1200" dirty="0">
+                        <a:effectLst/>
+                        <a:latin typeface="Times New Roman" panose="02020603050405020304" pitchFamily="18" charset="0"/>
+                        <a:ea typeface="Calibri" panose="020F0502020204030204" pitchFamily="34" charset="0"/>
+                        <a:cs typeface="Times New Roman" panose="02020603050405020304" pitchFamily="18" charset="0"/>
+                      </a:endParaRPr>
+                    </a:p>
+                  </a:txBody>
+                  <a:tcPr marL="68580" marR="68580" marT="0" marB="0"/>
+                </a:tc>
+                <a:extLst>
+                  <a:ext uri="{0D108BD9-81ED-4DB2-BD59-A6C34878D82A}">
+                    <a16:rowId xmlns:a16="http://schemas.microsoft.com/office/drawing/2014/main" val="63224399"/>
+                  </a:ext>
+                </a:extLst>
+              </a:tr>
+            </a:tbl>
+          </a:graphicData>
+        </a:graphic>
+      </p:graphicFrame>
+      <p:sp>
+        <p:nvSpPr>
+          <p:cNvPr id="4" name="Slayt Numarası Yer Tutucusu 3">
+            <a:extLst>
+              <a:ext uri="{FF2B5EF4-FFF2-40B4-BE49-F238E27FC236}">
+                <a16:creationId xmlns:a16="http://schemas.microsoft.com/office/drawing/2014/main" id="{DB52D836-696B-4CAD-B13A-23ABEAAF1E4D}"/>
+              </a:ext>
+            </a:extLst>
+          </p:cNvPr>
+          <p:cNvSpPr>
+            <a:spLocks noGrp="1"/>
+          </p:cNvSpPr>
+          <p:nvPr>
+            <p:ph type="sldNum" sz="quarter" idx="12"/>
+          </p:nvPr>
+        </p:nvSpPr>
+        <p:spPr/>
+        <p:txBody>
+          <a:bodyPr/>
+          <a:lstStyle/>
+          <a:p>
+            <a:pPr>
+              <a:defRPr/>
+            </a:pPr>
+            <a:fld id="{C878F797-6006-4DDA-AFE9-456F280FE6C5}" type="slidenum">
+              <a:rPr lang="en-US" smtClean="0"/>
+              <a:pPr>
+                <a:defRPr/>
+              </a:pPr>
+              <a:t>23</a:t>
+            </a:fld>
+            <a:endParaRPr lang="en-US" dirty="0"/>
+          </a:p>
+        </p:txBody>
+      </p:sp>
+      <p:sp>
+        <p:nvSpPr>
+          <p:cNvPr id="5" name="Veri Yer Tutucusu 4">
+            <a:extLst>
+              <a:ext uri="{FF2B5EF4-FFF2-40B4-BE49-F238E27FC236}">
+                <a16:creationId xmlns:a16="http://schemas.microsoft.com/office/drawing/2014/main" id="{F7435AA1-0F66-467C-A085-B8C9E680163E}"/>
+              </a:ext>
+            </a:extLst>
+          </p:cNvPr>
+          <p:cNvSpPr>
+            <a:spLocks noGrp="1"/>
+          </p:cNvSpPr>
+          <p:nvPr>
+            <p:ph type="dt" sz="half" idx="2"/>
+          </p:nvPr>
+        </p:nvSpPr>
+        <p:spPr/>
+        <p:txBody>
+          <a:bodyPr/>
+          <a:lstStyle/>
+          <a:p>
+            <a:pPr>
+              <a:defRPr/>
+            </a:pPr>
+            <a:r>
+              <a:rPr lang="tr-TR"/>
+              <a:t>METU Electrical &amp; Electronics Engineering Department</a:t>
+            </a:r>
+            <a:endParaRPr lang="en-US" dirty="0"/>
+          </a:p>
+        </p:txBody>
+      </p:sp>
+    </p:spTree>
+    <p:extLst>
+      <p:ext uri="{BB962C8B-B14F-4D97-AF65-F5344CB8AC3E}">
+        <p14:creationId xmlns:p14="http://schemas.microsoft.com/office/powerpoint/2010/main" val="2625067391"/>
+      </p:ext>
+    </p:extLst>
+  </p:cSld>
+  <p:clrMapOvr>
+    <a:masterClrMapping/>
+  </p:clrMapOvr>
+</p:sld>
+</file>
+
+<file path=ppt/slides/slide24.xml><?xml version="1.0" encoding="utf-8"?>
+<p:sld xmlns:a="http://schemas.openxmlformats.org/drawingml/2006/main" xmlns:r="http://schemas.openxmlformats.org/officeDocument/2006/relationships" xmlns:p="http://schemas.openxmlformats.org/presentationml/2006/main">
+  <p:cSld>
+    <p:spTree>
+      <p:nvGrpSpPr>
+        <p:cNvPr id="1" name=""/>
+        <p:cNvGrpSpPr/>
+        <p:nvPr/>
+      </p:nvGrpSpPr>
+      <p:grpSpPr>
+        <a:xfrm>
+          <a:off x="0" y="0"/>
+          <a:ext cx="0" cy="0"/>
+          <a:chOff x="0" y="0"/>
+          <a:chExt cx="0" cy="0"/>
+        </a:xfrm>
+      </p:grpSpPr>
+      <p:pic>
+        <p:nvPicPr>
+          <p:cNvPr id="7" name="İçerik Yer Tutucusu 6">
+            <a:extLst>
+              <a:ext uri="{FF2B5EF4-FFF2-40B4-BE49-F238E27FC236}">
+                <a16:creationId xmlns:a16="http://schemas.microsoft.com/office/drawing/2014/main" id="{39E97BC5-CDE2-4131-9E7D-96F5655792EC}"/>
+              </a:ext>
+            </a:extLst>
+          </p:cNvPr>
+          <p:cNvPicPr>
+            <a:picLocks noGrp="1" noChangeAspect="1"/>
+          </p:cNvPicPr>
+          <p:nvPr>
+            <p:ph idx="1"/>
+          </p:nvPr>
+        </p:nvPicPr>
+        <p:blipFill>
+          <a:blip r:embed="rId2"/>
+          <a:stretch>
+            <a:fillRect/>
+          </a:stretch>
+        </p:blipFill>
+        <p:spPr>
+          <a:xfrm>
+            <a:off x="-482601" y="883443"/>
+            <a:ext cx="4987925" cy="4987925"/>
+          </a:xfrm>
+        </p:spPr>
+      </p:pic>
+      <p:sp>
+        <p:nvSpPr>
+          <p:cNvPr id="2" name="Başlık 1">
+            <a:extLst>
+              <a:ext uri="{FF2B5EF4-FFF2-40B4-BE49-F238E27FC236}">
+                <a16:creationId xmlns:a16="http://schemas.microsoft.com/office/drawing/2014/main" id="{1741F4EC-35B3-4338-A802-280AD13DA724}"/>
+              </a:ext>
+            </a:extLst>
+          </p:cNvPr>
+          <p:cNvSpPr>
+            <a:spLocks noGrp="1"/>
+          </p:cNvSpPr>
+          <p:nvPr>
+            <p:ph type="title"/>
+          </p:nvPr>
+        </p:nvSpPr>
+        <p:spPr/>
+        <p:txBody>
+          <a:bodyPr/>
+          <a:lstStyle/>
+          <a:p>
+            <a:r>
+              <a:rPr lang="en-US" dirty="0"/>
+              <a:t>Heatsink(</a:t>
+            </a:r>
+            <a:r>
+              <a:rPr lang="en-US" sz="1800" dirty="0"/>
+              <a:t>HSE-B20380-040H-01</a:t>
+            </a:r>
+            <a:r>
+              <a:rPr lang="en-US" dirty="0"/>
+              <a:t> )</a:t>
+            </a:r>
+          </a:p>
+        </p:txBody>
+      </p:sp>
+      <p:sp>
+        <p:nvSpPr>
+          <p:cNvPr id="4" name="Slayt Numarası Yer Tutucusu 3">
+            <a:extLst>
+              <a:ext uri="{FF2B5EF4-FFF2-40B4-BE49-F238E27FC236}">
+                <a16:creationId xmlns:a16="http://schemas.microsoft.com/office/drawing/2014/main" id="{A6B683F9-067F-492C-899E-43F440A062A5}"/>
+              </a:ext>
+            </a:extLst>
+          </p:cNvPr>
+          <p:cNvSpPr>
+            <a:spLocks noGrp="1"/>
+          </p:cNvSpPr>
+          <p:nvPr>
+            <p:ph type="sldNum" sz="quarter" idx="12"/>
+          </p:nvPr>
+        </p:nvSpPr>
+        <p:spPr/>
+        <p:txBody>
+          <a:bodyPr/>
+          <a:lstStyle/>
+          <a:p>
+            <a:pPr>
+              <a:defRPr/>
+            </a:pPr>
+            <a:fld id="{C878F797-6006-4DDA-AFE9-456F280FE6C5}" type="slidenum">
+              <a:rPr lang="en-US" smtClean="0"/>
+              <a:pPr>
+                <a:defRPr/>
+              </a:pPr>
+              <a:t>24</a:t>
+            </a:fld>
+            <a:endParaRPr lang="en-US" dirty="0"/>
+          </a:p>
+        </p:txBody>
+      </p:sp>
+      <p:sp>
+        <p:nvSpPr>
+          <p:cNvPr id="5" name="Veri Yer Tutucusu 4">
+            <a:extLst>
+              <a:ext uri="{FF2B5EF4-FFF2-40B4-BE49-F238E27FC236}">
+                <a16:creationId xmlns:a16="http://schemas.microsoft.com/office/drawing/2014/main" id="{577DB2A2-FC42-4926-9341-6206B2198E89}"/>
+              </a:ext>
+            </a:extLst>
+          </p:cNvPr>
+          <p:cNvSpPr>
+            <a:spLocks noGrp="1"/>
+          </p:cNvSpPr>
+          <p:nvPr>
+            <p:ph type="dt" sz="half" idx="2"/>
+          </p:nvPr>
+        </p:nvSpPr>
+        <p:spPr/>
+        <p:txBody>
+          <a:bodyPr/>
+          <a:lstStyle/>
+          <a:p>
+            <a:pPr>
+              <a:defRPr/>
+            </a:pPr>
+            <a:r>
+              <a:rPr lang="tr-TR"/>
+              <a:t>METU Electrical &amp; Electronics Engineering Department</a:t>
+            </a:r>
+            <a:endParaRPr lang="en-US" dirty="0"/>
+          </a:p>
+        </p:txBody>
+      </p:sp>
+      <p:pic>
+        <p:nvPicPr>
+          <p:cNvPr id="9" name="Resim 8">
+            <a:extLst>
+              <a:ext uri="{FF2B5EF4-FFF2-40B4-BE49-F238E27FC236}">
+                <a16:creationId xmlns:a16="http://schemas.microsoft.com/office/drawing/2014/main" id="{96A93599-AA27-4B27-A087-C2E729BF173E}"/>
+              </a:ext>
+            </a:extLst>
+          </p:cNvPr>
+          <p:cNvPicPr>
+            <a:picLocks noChangeAspect="1"/>
+          </p:cNvPicPr>
+          <p:nvPr/>
+        </p:nvPicPr>
+        <p:blipFill>
+          <a:blip r:embed="rId3"/>
+          <a:stretch>
+            <a:fillRect/>
+          </a:stretch>
+        </p:blipFill>
+        <p:spPr>
+          <a:xfrm>
+            <a:off x="3852054" y="1668463"/>
+            <a:ext cx="5291946" cy="3417887"/>
+          </a:xfrm>
+          <a:prstGeom prst="rect">
+            <a:avLst/>
+          </a:prstGeom>
+        </p:spPr>
+      </p:pic>
+    </p:spTree>
+    <p:extLst>
+      <p:ext uri="{BB962C8B-B14F-4D97-AF65-F5344CB8AC3E}">
+        <p14:creationId xmlns:p14="http://schemas.microsoft.com/office/powerpoint/2010/main" val="3796091600"/>
+      </p:ext>
+    </p:extLst>
+  </p:cSld>
+  <p:clrMapOvr>
+    <a:masterClrMapping/>
+  </p:clrMapOvr>
+</p:sld>
+</file>
+
+<file path=ppt/slides/slide25.xml><?xml version="1.0" encoding="utf-8"?>
+<p:sld xmlns:a="http://schemas.openxmlformats.org/drawingml/2006/main" xmlns:r="http://schemas.openxmlformats.org/officeDocument/2006/relationships" xmlns:p="http://schemas.openxmlformats.org/presentationml/2006/main">
+  <p:cSld>
+    <p:spTree>
+      <p:nvGrpSpPr>
+        <p:cNvPr id="1" name=""/>
+        <p:cNvGrpSpPr/>
+        <p:nvPr/>
+      </p:nvGrpSpPr>
+      <p:grpSpPr>
+        <a:xfrm>
+          <a:off x="0" y="0"/>
+          <a:ext cx="0" cy="0"/>
+          <a:chOff x="0" y="0"/>
+          <a:chExt cx="0" cy="0"/>
+        </a:xfrm>
+      </p:grpSpPr>
+      <p:sp>
+        <p:nvSpPr>
+          <p:cNvPr id="2" name="Başlık 1">
+            <a:extLst>
+              <a:ext uri="{FF2B5EF4-FFF2-40B4-BE49-F238E27FC236}">
+                <a16:creationId xmlns:a16="http://schemas.microsoft.com/office/drawing/2014/main" id="{84F7DF60-E03B-474C-8CCE-EEABA3A02B78}"/>
+              </a:ext>
+            </a:extLst>
+          </p:cNvPr>
+          <p:cNvSpPr>
+            <a:spLocks noGrp="1"/>
+          </p:cNvSpPr>
+          <p:nvPr>
+            <p:ph type="title"/>
+          </p:nvPr>
+        </p:nvSpPr>
+        <p:spPr/>
+        <p:txBody>
+          <a:bodyPr/>
+          <a:lstStyle/>
+          <a:p>
+            <a:r>
               <a:rPr lang="tr-TR" dirty="0"/>
               <a:t>PCB Design</a:t>
             </a:r>
@@ -14730,7 +15787,7 @@
               <a:pPr>
                 <a:defRPr/>
               </a:pPr>
-              <a:t>24</a:t>
+              <a:t>25</a:t>
             </a:fld>
             <a:endParaRPr lang="en-US" dirty="0"/>
           </a:p>
@@ -14861,7 +15918,7 @@
 </p:sld>
 </file>
 
-<file path=ppt/slides/slide25.xml><?xml version="1.0" encoding="utf-8"?>
+<file path=ppt/slides/slide26.xml><?xml version="1.0" encoding="utf-8"?>
 <p:sld xmlns:a="http://schemas.openxmlformats.org/drawingml/2006/main" xmlns:r="http://schemas.openxmlformats.org/officeDocument/2006/relationships" xmlns:p="http://schemas.openxmlformats.org/presentationml/2006/main">
   <p:cSld>
     <p:spTree>
@@ -14907,7 +15964,7 @@
               <a:pPr>
                 <a:defRPr/>
               </a:pPr>
-              <a:t>25</a:t>
+              <a:t>26</a:t>
             </a:fld>
             <a:endParaRPr lang="en-US" dirty="0"/>
           </a:p>
@@ -15043,7 +16100,7 @@
 </p:sld>
 </file>
 
-<file path=ppt/slides/slide26.xml><?xml version="1.0" encoding="utf-8"?>
+<file path=ppt/slides/slide27.xml><?xml version="1.0" encoding="utf-8"?>
 <p:sld xmlns:a="http://schemas.openxmlformats.org/drawingml/2006/main" xmlns:r="http://schemas.openxmlformats.org/officeDocument/2006/relationships" xmlns:p="http://schemas.openxmlformats.org/presentationml/2006/main">
   <p:cSld>
     <p:spTree>
@@ -15114,7 +16171,7 @@
               <a:pPr>
                 <a:defRPr/>
               </a:pPr>
-              <a:t>26</a:t>
+              <a:t>27</a:t>
             </a:fld>
             <a:endParaRPr lang="en-US" dirty="0"/>
           </a:p>
@@ -15342,7 +16399,7 @@
 </p:sld>
 </file>
 
-<file path=ppt/slides/slide27.xml><?xml version="1.0" encoding="utf-8"?>
+<file path=ppt/slides/slide28.xml><?xml version="1.0" encoding="utf-8"?>
 <p:sld xmlns:a="http://schemas.openxmlformats.org/drawingml/2006/main" xmlns:r="http://schemas.openxmlformats.org/officeDocument/2006/relationships" xmlns:p="http://schemas.openxmlformats.org/presentationml/2006/main">
   <p:cSld>
     <p:spTree>
@@ -16781,7 +17838,7 @@
               <a:pPr>
                 <a:defRPr/>
               </a:pPr>
-              <a:t>27</a:t>
+              <a:t>28</a:t>
             </a:fld>
             <a:endParaRPr lang="en-US" dirty="0"/>
           </a:p>
@@ -16914,7 +17971,13 @@
             </a:extLst>
           </p:cNvPr>
           <p:cNvGraphicFramePr/>
-          <p:nvPr/>
+          <p:nvPr>
+            <p:extLst>
+              <p:ext uri="{D42A27DB-BD31-4B8C-83A1-F6EECF244321}">
+                <p14:modId xmlns:p14="http://schemas.microsoft.com/office/powerpoint/2010/main" val="447394469"/>
+              </p:ext>
+            </p:extLst>
+          </p:nvPr>
         </p:nvGraphicFramePr>
         <p:xfrm>
           <a:off x="1542288" y="1338390"/>

</xml_diff>